<commit_message>
version actualizada de la presentación
</commit_message>
<xml_diff>
--- a/Guia de estilo PEP8.pptx
+++ b/Guia de estilo PEP8.pptx
@@ -22,13 +22,9 @@
     <p:sldId id="264" r:id="rId16"/>
     <p:sldId id="265" r:id="rId17"/>
     <p:sldId id="271" r:id="rId18"/>
-    <p:sldId id="279" r:id="rId19"/>
-    <p:sldId id="280" r:id="rId20"/>
-    <p:sldId id="266" r:id="rId21"/>
-    <p:sldId id="272" r:id="rId22"/>
-    <p:sldId id="281" r:id="rId23"/>
-    <p:sldId id="282" r:id="rId24"/>
-    <p:sldId id="261" r:id="rId25"/>
+    <p:sldId id="266" r:id="rId19"/>
+    <p:sldId id="272" r:id="rId20"/>
+    <p:sldId id="261" r:id="rId21"/>
   </p:sldIdLst>
   <p:sldSz cx="12192000" cy="6858000"/>
   <p:notesSz cx="6858000" cy="9144000"/>
@@ -2975,8 +2971,8 @@
         </p:blipFill>
         <p:spPr>
           <a:xfrm>
-            <a:off x="-42437" y="-17765"/>
-            <a:ext cx="12336693" cy="6911313"/>
+            <a:off x="-42437" y="-698500"/>
+            <a:ext cx="12336693" cy="8242299"/>
           </a:xfrm>
           <a:prstGeom prst="rect">
             <a:avLst/>
@@ -3035,8 +3031,8 @@
         </p:blipFill>
         <p:spPr>
           <a:xfrm>
-            <a:off x="-1" y="-345440"/>
-            <a:ext cx="12192001" cy="7548880"/>
+            <a:off x="-1" y="-749300"/>
+            <a:ext cx="12192001" cy="8064500"/>
           </a:xfrm>
           <a:prstGeom prst="rect">
             <a:avLst/>
@@ -3837,7 +3833,7 @@
           <a:p>
             <a:fld id="{127DF3D6-C6D6-41CC-B591-575E42B5F4B5}" type="datetimeFigureOut">
               <a:rPr lang="es-CO" smtClean="0"/>
-              <a:t>11/03/2023</a:t>
+              <a:t>12/03/2023</a:t>
             </a:fld>
             <a:endParaRPr lang="es-CO"/>
           </a:p>
@@ -4303,14 +4299,14 @@
           </a:ln>
           <a:extLst>
             <a:ext uri="{909E8E84-426E-40dd-AFC4-6F175D3DCCD1}">
-              <a14:hiddenFill xmlns:a14="http://schemas.microsoft.com/office/drawing/2010/main" xmlns="">
+              <a14:hiddenFill xmlns="" xmlns:a14="http://schemas.microsoft.com/office/drawing/2010/main">
                 <a:solidFill>
                   <a:srgbClr val="FFFFFF"/>
                 </a:solidFill>
               </a14:hiddenFill>
             </a:ext>
             <a:ext uri="{91240B29-F687-4f45-9708-019B960494DF}">
-              <a14:hiddenLine xmlns:a14="http://schemas.microsoft.com/office/drawing/2010/main" xmlns="" w="9525">
+              <a14:hiddenLine xmlns="" xmlns:a14="http://schemas.microsoft.com/office/drawing/2010/main" w="9525">
                 <a:solidFill>
                   <a:srgbClr val="000000"/>
                 </a:solidFill>
@@ -4361,14 +4357,14 @@
           </a:ln>
           <a:extLst>
             <a:ext uri="{909E8E84-426E-40dd-AFC4-6F175D3DCCD1}">
-              <a14:hiddenFill xmlns:a14="http://schemas.microsoft.com/office/drawing/2010/main" xmlns="">
+              <a14:hiddenFill xmlns="" xmlns:a14="http://schemas.microsoft.com/office/drawing/2010/main">
                 <a:solidFill>
                   <a:srgbClr val="FFFFFF"/>
                 </a:solidFill>
               </a14:hiddenFill>
             </a:ext>
             <a:ext uri="{91240B29-F687-4f45-9708-019B960494DF}">
-              <a14:hiddenLine xmlns:a14="http://schemas.microsoft.com/office/drawing/2010/main" xmlns="" w="9525">
+              <a14:hiddenLine xmlns="" xmlns:a14="http://schemas.microsoft.com/office/drawing/2010/main" w="9525">
                 <a:solidFill>
                   <a:srgbClr val="000000"/>
                 </a:solidFill>
@@ -9892,32 +9888,70 @@
             <p:ph idx="1"/>
           </p:nvPr>
         </p:nvSpPr>
-        <p:spPr/>
+        <p:spPr>
+          <a:xfrm>
+            <a:off x="2834640" y="1168400"/>
+            <a:ext cx="8331201" cy="4204817"/>
+          </a:xfrm>
+        </p:spPr>
         <p:txBody>
           <a:bodyPr/>
           <a:lstStyle/>
           <a:p>
+            <a:pPr marL="0" indent="0">
+              <a:buNone/>
+            </a:pPr>
             <a:r>
               <a:rPr lang="es-MX" dirty="0"/>
-              <a:t>Use nombres en minúsculas para las variables.</a:t>
-            </a:r>
-          </a:p>
-          <a:p>
+              <a:t>👉 Usar nombres </a:t>
+            </a:r>
+            <a:r>
+              <a:rPr lang="es-MX" b="1" dirty="0"/>
+              <a:t>descriptivos </a:t>
+            </a:r>
+            <a:r>
+              <a:rPr lang="es-MX" dirty="0"/>
+              <a:t>en </a:t>
+            </a:r>
+            <a:r>
+              <a:rPr lang="es-MX" b="1" dirty="0"/>
+              <a:t>minúsculas </a:t>
+            </a:r>
+            <a:r>
+              <a:rPr lang="es-MX" dirty="0"/>
+              <a:t>(en lugar de variable 'x', es mejor un nombre más descriptivo como “contador” o “suma”</a:t>
+            </a:r>
+          </a:p>
+          <a:p>
+            <a:pPr marL="0" indent="0">
+              <a:buNone/>
+            </a:pPr>
             <a:endParaRPr lang="es-MX" dirty="0"/>
           </a:p>
           <a:p>
+            <a:pPr marL="0" indent="0">
+              <a:buNone/>
+            </a:pPr>
             <a:r>
               <a:rPr lang="es-MX" dirty="0"/>
-              <a:t>Use guiones bajos (_) para separar palabras en nombres de variables compuestas.</a:t>
-            </a:r>
-          </a:p>
-          <a:p>
-            <a:endParaRPr lang="es-MX" dirty="0"/>
-          </a:p>
-          <a:p>
+              <a:t>Para nombrar variables de varias palabras (usar solo uno de los dos)</a:t>
+            </a:r>
+          </a:p>
+          <a:p>
+            <a:pPr marL="0" indent="0">
+              <a:buNone/>
+            </a:pPr>
             <a:r>
               <a:rPr lang="es-MX" dirty="0"/>
-              <a:t>Ejemplo: </a:t>
+              <a:t>👉 Usar </a:t>
+            </a:r>
+            <a:r>
+              <a:rPr lang="es-MX" b="1" dirty="0"/>
+              <a:t>guiones bajos</a:t>
+            </a:r>
+            <a:r>
+              <a:rPr lang="es-MX" dirty="0"/>
+              <a:t> (_) -&gt; </a:t>
             </a:r>
             <a:r>
               <a:rPr lang="es-MX" dirty="0" err="1"/>
@@ -9926,64 +9960,65 @@
             <a:endParaRPr lang="es-MX" dirty="0"/>
           </a:p>
           <a:p>
+            <a:pPr marL="0" indent="0">
+              <a:buNone/>
+            </a:pPr>
+            <a:r>
+              <a:rPr lang="es-MX" dirty="0"/>
+              <a:t>👉 Usar </a:t>
+            </a:r>
+            <a:r>
+              <a:rPr lang="es-MX" b="1" dirty="0"/>
+              <a:t>camel case </a:t>
+            </a:r>
+            <a:r>
+              <a:rPr lang="es-MX" dirty="0"/>
+              <a:t>(letras mayúsculas al comienzo de cada palabra adicional)  -&gt; </a:t>
+            </a:r>
+            <a:r>
+              <a:rPr lang="es-MX" dirty="0" err="1"/>
+              <a:t>VariableCamelCase</a:t>
+            </a:r>
             <a:endParaRPr lang="es-MX" dirty="0"/>
           </a:p>
           <a:p>
-            <a:r>
-              <a:rPr lang="es-MX" dirty="0"/>
-              <a:t>Evite usar caracteres especiales como 'l' (letra ele minúscula) y 'O' (letra o mayúscula) como nombres de variables, ya que pueden confundirse con números 1 y 0, respectivamente.</a:t>
-            </a:r>
-          </a:p>
-          <a:p>
+            <a:pPr marL="0" indent="0">
+              <a:buNone/>
+            </a:pPr>
+            <a:r>
+              <a:rPr lang="es-MX" b="1" dirty="0"/>
+              <a:t>👉 No mezclar camel case con uso de guiones </a:t>
+            </a:r>
+          </a:p>
+          <a:p>
+            <a:pPr marL="0" indent="0">
+              <a:buNone/>
+            </a:pPr>
+            <a:endParaRPr lang="es-MX" dirty="0">
+              <a:solidFill>
+                <a:srgbClr val="FF0000"/>
+              </a:solidFill>
+            </a:endParaRPr>
+          </a:p>
+          <a:p>
+            <a:pPr marL="0" indent="0">
+              <a:buNone/>
+            </a:pPr>
+            <a:r>
+              <a:rPr lang="es-MX" dirty="0">
+                <a:solidFill>
+                  <a:srgbClr val="FF0000"/>
+                </a:solidFill>
+              </a:rPr>
+              <a:t>✖</a:t>
+            </a:r>
             <a:endParaRPr lang="es-MX" dirty="0"/>
           </a:p>
           <a:p>
-            <a:r>
-              <a:rPr lang="es-MX" dirty="0"/>
-              <a:t>Use nombres de variables que sean descriptivos y que reflejen su propósito.</a:t>
-            </a:r>
-          </a:p>
-          <a:p>
+            <a:pPr marL="0" indent="0">
+              <a:buNone/>
+            </a:pPr>
             <a:endParaRPr lang="es-MX" dirty="0"/>
-          </a:p>
-          <a:p>
-            <a:r>
-              <a:rPr lang="es-MX" dirty="0"/>
-              <a:t>Ejemplo: en lugar de nombrar una variable 'x', es mejor usar un nombre más descriptivo como 'contador' o 'suma'.</a:t>
-            </a:r>
-          </a:p>
-          <a:p>
-            <a:endParaRPr lang="es-MX" dirty="0"/>
-          </a:p>
-          <a:p>
-            <a:r>
-              <a:rPr lang="es-MX" dirty="0"/>
-              <a:t>Para nombres de variables de varias palabras, utilice letras mayúsculas al comienzo de cada palabra adicional (conocido como camel case).</a:t>
-            </a:r>
-          </a:p>
-          <a:p>
-            <a:endParaRPr lang="es-MX" dirty="0"/>
-          </a:p>
-          <a:p>
-            <a:r>
-              <a:rPr lang="es-MX" dirty="0"/>
-              <a:t>Ejemplo: </a:t>
-            </a:r>
-            <a:r>
-              <a:rPr lang="es-MX" dirty="0" err="1"/>
-              <a:t>miVariableCamelCase</a:t>
-            </a:r>
-            <a:endParaRPr lang="es-MX" dirty="0"/>
-          </a:p>
-          <a:p>
-            <a:endParaRPr lang="es-MX" dirty="0"/>
-          </a:p>
-          <a:p>
-            <a:r>
-              <a:rPr lang="es-MX" dirty="0"/>
-              <a:t>No use guiones bajos al principio o al final del nombre de una variable, ya que este estilo se reserva generalmente para variables especiales o métodos.</a:t>
-            </a:r>
-            <a:endParaRPr lang="es-CO" dirty="0"/>
           </a:p>
         </p:txBody>
       </p:sp>
@@ -10796,6 +10831,36 @@
           </a:p>
         </p:txBody>
       </p:sp>
+      <p:pic>
+        <p:nvPicPr>
+          <p:cNvPr id="2" name="Imagen 1">
+            <a:extLst>
+              <a:ext uri="{FF2B5EF4-FFF2-40B4-BE49-F238E27FC236}">
+                <a16:creationId xmlns:a16="http://schemas.microsoft.com/office/drawing/2014/main" id="{ACF0B478-8DC6-E329-356C-D5F14CD87AAA}"/>
+              </a:ext>
+            </a:extLst>
+          </p:cNvPr>
+          <p:cNvPicPr>
+            <a:picLocks noChangeAspect="1"/>
+          </p:cNvPicPr>
+          <p:nvPr/>
+        </p:nvPicPr>
+        <p:blipFill>
+          <a:blip r:embed="rId2"/>
+          <a:stretch>
+            <a:fillRect/>
+          </a:stretch>
+        </p:blipFill>
+        <p:spPr>
+          <a:xfrm>
+            <a:off x="3446948" y="4440457"/>
+            <a:ext cx="4136053" cy="932760"/>
+          </a:xfrm>
+          <a:prstGeom prst="rect">
+            <a:avLst/>
+          </a:prstGeom>
+        </p:spPr>
+      </p:pic>
     </p:spTree>
     <p:extLst>
       <p:ext uri="{BB962C8B-B14F-4D97-AF65-F5344CB8AC3E}">
@@ -10849,7 +10914,7 @@
           <a:p>
             <a:r>
               <a:rPr lang="es-MX" dirty="0"/>
-              <a:t>Evitar</a:t>
+              <a:t>Nombrar variables (cont.)</a:t>
             </a:r>
             <a:endParaRPr lang="es-CO" dirty="0"/>
           </a:p>
@@ -10871,12 +10936,177 @@
             <p:ph idx="1"/>
           </p:nvPr>
         </p:nvSpPr>
-        <p:spPr/>
+        <p:spPr>
+          <a:xfrm>
+            <a:off x="2834640" y="1168400"/>
+            <a:ext cx="8331201" cy="4660900"/>
+          </a:xfrm>
+        </p:spPr>
         <p:txBody>
           <a:bodyPr/>
           <a:lstStyle/>
           <a:p>
-            <a:endParaRPr lang="es-CO"/>
+            <a:pPr marL="0" indent="0">
+              <a:buNone/>
+            </a:pPr>
+            <a:r>
+              <a:rPr lang="es-MX" dirty="0"/>
+              <a:t>👉 Evitar usar caracteres como </a:t>
+            </a:r>
+            <a:r>
+              <a:rPr lang="es-MX" b="1" dirty="0"/>
+              <a:t>'l' (letra ele minúscula) y 'O' (letra o mayúscula) </a:t>
+            </a:r>
+            <a:r>
+              <a:rPr lang="es-MX" dirty="0"/>
+              <a:t>al nombrar variables, porque se confunden con 1 y 0</a:t>
+            </a:r>
+          </a:p>
+          <a:p>
+            <a:endParaRPr lang="es-MX" dirty="0"/>
+          </a:p>
+          <a:p>
+            <a:pPr marL="0" indent="0">
+              <a:buNone/>
+            </a:pPr>
+            <a:r>
+              <a:rPr lang="es-MX" dirty="0"/>
+              <a:t>👉 No use guiones bajos al principio o al final de una variable, porque esta reservado para variables o métodos especiales</a:t>
+            </a:r>
+          </a:p>
+          <a:p>
+            <a:pPr marL="0" indent="0">
+              <a:buNone/>
+            </a:pPr>
+            <a:endParaRPr lang="es-MX" dirty="0"/>
+          </a:p>
+          <a:p>
+            <a:pPr marL="0" indent="0">
+              <a:buNone/>
+            </a:pPr>
+            <a:r>
+              <a:rPr lang="es-MX" dirty="0">
+                <a:solidFill>
+                  <a:srgbClr val="00B050"/>
+                </a:solidFill>
+              </a:rPr>
+              <a:t>✔ </a:t>
+            </a:r>
+            <a:r>
+              <a:rPr lang="es-MX" dirty="0"/>
+              <a:t>Nombrar </a:t>
+            </a:r>
+            <a:r>
+              <a:rPr lang="es-MX" b="1" dirty="0"/>
+              <a:t>paquetes y módulos:</a:t>
+            </a:r>
+            <a:r>
+              <a:rPr lang="es-MX" dirty="0"/>
+              <a:t> en minúsculas</a:t>
+            </a:r>
+          </a:p>
+          <a:p>
+            <a:pPr marL="0" indent="0">
+              <a:buNone/>
+            </a:pPr>
+            <a:r>
+              <a:rPr lang="es-MX" dirty="0">
+                <a:solidFill>
+                  <a:srgbClr val="00B050"/>
+                </a:solidFill>
+              </a:rPr>
+              <a:t>✔ </a:t>
+            </a:r>
+            <a:r>
+              <a:rPr lang="es-MX" dirty="0"/>
+              <a:t>Nombrar </a:t>
+            </a:r>
+            <a:r>
+              <a:rPr lang="es-MX" b="1" dirty="0"/>
+              <a:t>clases: </a:t>
+            </a:r>
+            <a:r>
+              <a:rPr lang="es-MX" dirty="0"/>
+              <a:t>con camel case</a:t>
+            </a:r>
+          </a:p>
+          <a:p>
+            <a:pPr marL="0" indent="0">
+              <a:buNone/>
+            </a:pPr>
+            <a:r>
+              <a:rPr lang="es-MX" dirty="0">
+                <a:solidFill>
+                  <a:srgbClr val="00B050"/>
+                </a:solidFill>
+              </a:rPr>
+              <a:t>✔ </a:t>
+            </a:r>
+            <a:r>
+              <a:rPr lang="es-MX" dirty="0"/>
+              <a:t>Nombrar </a:t>
+            </a:r>
+            <a:r>
+              <a:rPr lang="es-MX" b="1" dirty="0"/>
+              <a:t>excepciones:</a:t>
+            </a:r>
+            <a:r>
+              <a:rPr lang="es-MX" dirty="0"/>
+              <a:t> con camel case y usar el sufijo “error”</a:t>
+            </a:r>
+          </a:p>
+          <a:p>
+            <a:pPr marL="0" indent="0">
+              <a:buNone/>
+            </a:pPr>
+            <a:r>
+              <a:rPr lang="es-MX" dirty="0">
+                <a:solidFill>
+                  <a:srgbClr val="00B050"/>
+                </a:solidFill>
+              </a:rPr>
+              <a:t>✔ </a:t>
+            </a:r>
+            <a:r>
+              <a:rPr lang="es-MX" dirty="0"/>
+              <a:t>Nombrar </a:t>
+            </a:r>
+            <a:r>
+              <a:rPr lang="es-MX" b="1" dirty="0"/>
+              <a:t>funciones:</a:t>
+            </a:r>
+            <a:r>
+              <a:rPr lang="es-MX" dirty="0"/>
+              <a:t> en minúsculas y guion bajo como separador</a:t>
+            </a:r>
+          </a:p>
+          <a:p>
+            <a:pPr marL="0" indent="0">
+              <a:buNone/>
+            </a:pPr>
+            <a:r>
+              <a:rPr lang="es-MX" dirty="0">
+                <a:solidFill>
+                  <a:srgbClr val="00B050"/>
+                </a:solidFill>
+              </a:rPr>
+              <a:t>✔ </a:t>
+            </a:r>
+            <a:r>
+              <a:rPr lang="es-MX" dirty="0"/>
+              <a:t>Nombrar </a:t>
+            </a:r>
+            <a:r>
+              <a:rPr lang="es-MX" b="1" dirty="0"/>
+              <a:t>constantes: </a:t>
+            </a:r>
+            <a:r>
+              <a:rPr lang="es-MX" dirty="0"/>
+              <a:t>en mayúsculas y guion bajo como separador</a:t>
+            </a:r>
+          </a:p>
+          <a:p>
+            <a:endParaRPr lang="es-CO" dirty="0"/>
           </a:p>
         </p:txBody>
       </p:sp>
@@ -11741,10 +11971,10 @@
           <a:lstStyle/>
           <a:p>
             <a:r>
-              <a:rPr lang="es-MX" sz="3800" dirty="0"/>
-              <a:t>Recomendaciones de nomenclatura</a:t>
-            </a:r>
-            <a:endParaRPr lang="es-CO" sz="3800" dirty="0"/>
+              <a:rPr lang="es-MX" dirty="0"/>
+              <a:t>Recomendaciones al programar</a:t>
+            </a:r>
+            <a:endParaRPr lang="es-CO" dirty="0"/>
           </a:p>
         </p:txBody>
       </p:sp>
@@ -11769,36 +11999,108 @@
           <a:bodyPr/>
           <a:lstStyle/>
           <a:p>
+            <a:pPr marL="0" indent="0">
+              <a:buNone/>
+            </a:pPr>
             <a:r>
               <a:rPr lang="es-MX" dirty="0"/>
-              <a:t>Use nombres en </a:t>
+              <a:t>👉 Usar el operador “</a:t>
             </a:r>
             <a:r>
               <a:rPr lang="es-MX" dirty="0" err="1"/>
-              <a:t>CamelCase</a:t>
+              <a:t>is</a:t>
             </a:r>
             <a:r>
               <a:rPr lang="es-MX" dirty="0"/>
-              <a:t> para las clases.</a:t>
-            </a:r>
-          </a:p>
-          <a:p>
+              <a:t> </a:t>
+            </a:r>
+            <a:r>
+              <a:rPr lang="es-MX" dirty="0" err="1"/>
+              <a:t>not</a:t>
+            </a:r>
             <a:r>
               <a:rPr lang="es-MX" dirty="0"/>
-              <a:t>El primer carácter del nombre de la clase debe ser una letra mayúscula.</a:t>
-            </a:r>
-          </a:p>
-          <a:p>
+              <a:t>" en lugar de “</a:t>
+            </a:r>
+            <a:r>
+              <a:rPr lang="es-MX" dirty="0" err="1"/>
+              <a:t>not</a:t>
+            </a:r>
             <a:r>
               <a:rPr lang="es-MX" dirty="0"/>
-              <a:t>Si el nombre de la clase consta de varias palabras, cada palabra debe comenzar con una letra mayúscula (sin guiones bajos).</a:t>
-            </a:r>
-          </a:p>
-          <a:p>
+              <a:t> ... </a:t>
+            </a:r>
+            <a:r>
+              <a:rPr lang="es-MX" dirty="0" err="1"/>
+              <a:t>is</a:t>
+            </a:r>
             <a:r>
               <a:rPr lang="es-MX" dirty="0"/>
-              <a:t>Evite utilizar nombres de una sola letra para las clases. En su lugar, utilice nombres descriptivos que reflejen el propósito de la clase.</a:t>
-            </a:r>
+              <a:t>".</a:t>
+            </a:r>
+          </a:p>
+          <a:p>
+            <a:pPr marL="0" indent="0">
+              <a:buNone/>
+            </a:pPr>
+            <a:endParaRPr lang="es-MX" dirty="0"/>
+          </a:p>
+          <a:p>
+            <a:pPr marL="0" indent="0">
+              <a:buNone/>
+            </a:pPr>
+            <a:r>
+              <a:rPr lang="es-MX" dirty="0">
+                <a:solidFill>
+                  <a:srgbClr val="00B050"/>
+                </a:solidFill>
+              </a:rPr>
+              <a:t>✔					</a:t>
+            </a:r>
+            <a:r>
+              <a:rPr lang="es-MX" dirty="0">
+                <a:solidFill>
+                  <a:srgbClr val="FF0000"/>
+                </a:solidFill>
+              </a:rPr>
+              <a:t>✖</a:t>
+            </a:r>
+            <a:endParaRPr lang="es-MX" dirty="0"/>
+          </a:p>
+          <a:p>
+            <a:pPr marL="0" indent="0">
+              <a:buNone/>
+            </a:pPr>
+            <a:endParaRPr lang="es-CO" dirty="0"/>
+          </a:p>
+          <a:p>
+            <a:pPr marL="0" indent="0">
+              <a:buNone/>
+            </a:pPr>
+            <a:endParaRPr lang="es-MX" dirty="0"/>
+          </a:p>
+          <a:p>
+            <a:pPr marL="0" indent="0">
+              <a:buNone/>
+            </a:pPr>
+            <a:r>
+              <a:rPr lang="es-MX" dirty="0"/>
+              <a:t>👉 Todas las declaraciones de retorno en una función deben devolver una expresión, o ninguna de ellas. En caso de no devolver ninguna expresión, indicar con “</a:t>
+            </a:r>
+            <a:r>
+              <a:rPr lang="es-MX" dirty="0" err="1"/>
+              <a:t>None</a:t>
+            </a:r>
+            <a:r>
+              <a:rPr lang="es-MX" dirty="0"/>
+              <a:t>”</a:t>
+            </a:r>
+            <a:endParaRPr lang="es-CO" dirty="0"/>
+          </a:p>
+          <a:p>
+            <a:pPr marL="0" indent="0">
+              <a:buNone/>
+            </a:pPr>
             <a:endParaRPr lang="es-CO" dirty="0"/>
           </a:p>
         </p:txBody>
@@ -12414,6 +12716,11 @@
               </a:path>
             </a:pathLst>
           </a:custGeom>
+          <a:solidFill>
+            <a:schemeClr val="accent1">
+              <a:alpha val="20000"/>
+            </a:schemeClr>
+          </a:solidFill>
           <a:ln>
             <a:noFill/>
           </a:ln>
@@ -12544,11 +12851,6 @@
               </a:path>
             </a:pathLst>
           </a:custGeom>
-          <a:solidFill>
-            <a:schemeClr val="accent1">
-              <a:alpha val="20000"/>
-            </a:schemeClr>
-          </a:solidFill>
           <a:ln>
             <a:noFill/>
           </a:ln>
@@ -12612,10 +12914,100 @@
           </a:p>
         </p:txBody>
       </p:sp>
+      <p:pic>
+        <p:nvPicPr>
+          <p:cNvPr id="3" name="Imagen 2">
+            <a:extLst>
+              <a:ext uri="{FF2B5EF4-FFF2-40B4-BE49-F238E27FC236}">
+                <a16:creationId xmlns:a16="http://schemas.microsoft.com/office/drawing/2014/main" id="{24B692D3-5751-C910-7B95-CA25C350B0CE}"/>
+              </a:ext>
+            </a:extLst>
+          </p:cNvPr>
+          <p:cNvPicPr>
+            <a:picLocks noChangeAspect="1"/>
+          </p:cNvPicPr>
+          <p:nvPr/>
+        </p:nvPicPr>
+        <p:blipFill>
+          <a:blip r:embed="rId2"/>
+          <a:stretch>
+            <a:fillRect/>
+          </a:stretch>
+        </p:blipFill>
+        <p:spPr>
+          <a:xfrm>
+            <a:off x="3311259" y="1748745"/>
+            <a:ext cx="2784741" cy="829890"/>
+          </a:xfrm>
+          <a:prstGeom prst="rect">
+            <a:avLst/>
+          </a:prstGeom>
+        </p:spPr>
+      </p:pic>
+      <p:pic>
+        <p:nvPicPr>
+          <p:cNvPr id="5" name="Imagen 4">
+            <a:extLst>
+              <a:ext uri="{FF2B5EF4-FFF2-40B4-BE49-F238E27FC236}">
+                <a16:creationId xmlns:a16="http://schemas.microsoft.com/office/drawing/2014/main" id="{743A2C57-5590-270F-CD82-C06A8786D951}"/>
+              </a:ext>
+            </a:extLst>
+          </p:cNvPr>
+          <p:cNvPicPr>
+            <a:picLocks noChangeAspect="1"/>
+          </p:cNvPicPr>
+          <p:nvPr/>
+        </p:nvPicPr>
+        <p:blipFill>
+          <a:blip r:embed="rId3"/>
+          <a:stretch>
+            <a:fillRect/>
+          </a:stretch>
+        </p:blipFill>
+        <p:spPr>
+          <a:xfrm>
+            <a:off x="7940409" y="1761359"/>
+            <a:ext cx="2683310" cy="839111"/>
+          </a:xfrm>
+          <a:prstGeom prst="rect">
+            <a:avLst/>
+          </a:prstGeom>
+        </p:spPr>
+      </p:pic>
+      <p:pic>
+        <p:nvPicPr>
+          <p:cNvPr id="11" name="Imagen 10">
+            <a:extLst>
+              <a:ext uri="{FF2B5EF4-FFF2-40B4-BE49-F238E27FC236}">
+                <a16:creationId xmlns:a16="http://schemas.microsoft.com/office/drawing/2014/main" id="{40560454-A741-90DD-4C1D-B42D6275F69A}"/>
+              </a:ext>
+            </a:extLst>
+          </p:cNvPr>
+          <p:cNvPicPr>
+            <a:picLocks noChangeAspect="1"/>
+          </p:cNvPicPr>
+          <p:nvPr/>
+        </p:nvPicPr>
+        <p:blipFill>
+          <a:blip r:embed="rId4"/>
+          <a:stretch>
+            <a:fillRect/>
+          </a:stretch>
+        </p:blipFill>
+        <p:spPr>
+          <a:xfrm>
+            <a:off x="5489901" y="4401426"/>
+            <a:ext cx="2677777" cy="1288174"/>
+          </a:xfrm>
+          <a:prstGeom prst="rect">
+            <a:avLst/>
+          </a:prstGeom>
+        </p:spPr>
+      </p:pic>
     </p:spTree>
     <p:extLst>
       <p:ext uri="{BB962C8B-B14F-4D97-AF65-F5344CB8AC3E}">
-        <p14:creationId xmlns:p14="http://schemas.microsoft.com/office/powerpoint/2010/main" val="2136188275"/>
+        <p14:creationId xmlns:p14="http://schemas.microsoft.com/office/powerpoint/2010/main" val="3965756532"/>
       </p:ext>
     </p:extLst>
   </p:cSld>
@@ -12664,10 +13056,10 @@
           <a:lstStyle/>
           <a:p>
             <a:r>
-              <a:rPr lang="es-MX" sz="3800" dirty="0"/>
-              <a:t>Recomendaciones de nomenclatura (cont.)</a:t>
-            </a:r>
-            <a:endParaRPr lang="es-CO" sz="3800" dirty="0"/>
+              <a:rPr lang="es-MX" dirty="0"/>
+              <a:t>Recomendaciones sobre funciones</a:t>
+            </a:r>
+            <a:endParaRPr lang="es-CO" dirty="0"/>
           </a:p>
         </p:txBody>
       </p:sp>
@@ -12692,7 +13084,66 @@
           <a:bodyPr/>
           <a:lstStyle/>
           <a:p>
-            <a:endParaRPr lang="es-CO"/>
+            <a:pPr marL="0" indent="0">
+              <a:buNone/>
+            </a:pPr>
+            <a:r>
+              <a:rPr lang="es-MX" dirty="0"/>
+              <a:t>👉 Usar “</a:t>
+            </a:r>
+            <a:r>
+              <a:rPr lang="es-MX" dirty="0" err="1"/>
+              <a:t>isinstance</a:t>
+            </a:r>
+            <a:r>
+              <a:rPr lang="es-MX" dirty="0"/>
+              <a:t>()” para comparar tipos de objetos</a:t>
+            </a:r>
+          </a:p>
+          <a:p>
+            <a:pPr marL="0" indent="0">
+              <a:buNone/>
+            </a:pPr>
+            <a:endParaRPr lang="es-MX" dirty="0"/>
+          </a:p>
+          <a:p>
+            <a:pPr marL="0" indent="0">
+              <a:buNone/>
+            </a:pPr>
+            <a:endParaRPr lang="es-MX" dirty="0"/>
+          </a:p>
+          <a:p>
+            <a:pPr marL="0" indent="0">
+              <a:buNone/>
+            </a:pPr>
+            <a:endParaRPr lang="es-MX" dirty="0"/>
+          </a:p>
+          <a:p>
+            <a:pPr marL="0" indent="0">
+              <a:buNone/>
+            </a:pPr>
+            <a:endParaRPr lang="es-MX" dirty="0"/>
+          </a:p>
+          <a:p>
+            <a:pPr marL="0" indent="0">
+              <a:buNone/>
+            </a:pPr>
+            <a:endParaRPr lang="es-MX" dirty="0"/>
+          </a:p>
+          <a:p>
+            <a:pPr marL="0" indent="0">
+              <a:buNone/>
+            </a:pPr>
+            <a:r>
+              <a:rPr lang="es-MX" dirty="0"/>
+              <a:t>👉 No comparar valores booleanos (verdadero / falso) usando ==</a:t>
+            </a:r>
+          </a:p>
+          <a:p>
+            <a:pPr marL="0" indent="0">
+              <a:buNone/>
+            </a:pPr>
+            <a:endParaRPr lang="es-MX" dirty="0"/>
           </a:p>
         </p:txBody>
       </p:sp>
@@ -13307,6 +13758,11 @@
               </a:path>
             </a:pathLst>
           </a:custGeom>
+          <a:solidFill>
+            <a:schemeClr val="accent1">
+              <a:alpha val="20000"/>
+            </a:schemeClr>
+          </a:solidFill>
           <a:ln>
             <a:noFill/>
           </a:ln>
@@ -13437,11 +13893,6 @@
               </a:path>
             </a:pathLst>
           </a:custGeom>
-          <a:solidFill>
-            <a:schemeClr val="accent1">
-              <a:alpha val="20000"/>
-            </a:schemeClr>
-          </a:solidFill>
           <a:ln>
             <a:noFill/>
           </a:ln>
@@ -13505,10 +13956,70 @@
           </a:p>
         </p:txBody>
       </p:sp>
+      <p:pic>
+        <p:nvPicPr>
+          <p:cNvPr id="3" name="Imagen 2">
+            <a:extLst>
+              <a:ext uri="{FF2B5EF4-FFF2-40B4-BE49-F238E27FC236}">
+                <a16:creationId xmlns:a16="http://schemas.microsoft.com/office/drawing/2014/main" id="{B916FA1A-8390-FE9F-2A15-4D7230DECA57}"/>
+              </a:ext>
+            </a:extLst>
+          </p:cNvPr>
+          <p:cNvPicPr>
+            <a:picLocks noChangeAspect="1"/>
+          </p:cNvPicPr>
+          <p:nvPr/>
+        </p:nvPicPr>
+        <p:blipFill>
+          <a:blip r:embed="rId2"/>
+          <a:stretch>
+            <a:fillRect/>
+          </a:stretch>
+        </p:blipFill>
+        <p:spPr>
+          <a:xfrm>
+            <a:off x="4633214" y="1727307"/>
+            <a:ext cx="2925571" cy="1701693"/>
+          </a:xfrm>
+          <a:prstGeom prst="rect">
+            <a:avLst/>
+          </a:prstGeom>
+        </p:spPr>
+      </p:pic>
+      <p:pic>
+        <p:nvPicPr>
+          <p:cNvPr id="6" name="Imagen 5">
+            <a:extLst>
+              <a:ext uri="{FF2B5EF4-FFF2-40B4-BE49-F238E27FC236}">
+                <a16:creationId xmlns:a16="http://schemas.microsoft.com/office/drawing/2014/main" id="{2E2A1A43-5F05-3C98-A2CA-00B4878F8BD2}"/>
+              </a:ext>
+            </a:extLst>
+          </p:cNvPr>
+          <p:cNvPicPr>
+            <a:picLocks noChangeAspect="1"/>
+          </p:cNvPicPr>
+          <p:nvPr/>
+        </p:nvPicPr>
+        <p:blipFill>
+          <a:blip r:embed="rId3"/>
+          <a:stretch>
+            <a:fillRect/>
+          </a:stretch>
+        </p:blipFill>
+        <p:spPr>
+          <a:xfrm>
+            <a:off x="4766195" y="4226821"/>
+            <a:ext cx="2766300" cy="1743607"/>
+          </a:xfrm>
+          <a:prstGeom prst="rect">
+            <a:avLst/>
+          </a:prstGeom>
+        </p:spPr>
+      </p:pic>
     </p:spTree>
     <p:extLst>
       <p:ext uri="{BB962C8B-B14F-4D97-AF65-F5344CB8AC3E}">
-        <p14:creationId xmlns:p14="http://schemas.microsoft.com/office/powerpoint/2010/main" val="3893357490"/>
+        <p14:creationId xmlns:p14="http://schemas.microsoft.com/office/powerpoint/2010/main" val="356653590"/>
       </p:ext>
     </p:extLst>
   </p:cSld>
@@ -13535,873 +14046,10 @@
           <a:chExt cx="0" cy="0"/>
         </a:xfrm>
       </p:grpSpPr>
-      <p:sp>
-        <p:nvSpPr>
-          <p:cNvPr id="8" name="Título 7">
-            <a:extLst>
-              <a:ext uri="{FF2B5EF4-FFF2-40B4-BE49-F238E27FC236}">
-                <a16:creationId xmlns:a16="http://schemas.microsoft.com/office/drawing/2014/main" id="{C6BA3E19-8EA0-F3F8-B8DB-8D3D11BCADB7}"/>
-              </a:ext>
-            </a:extLst>
-          </p:cNvPr>
-          <p:cNvSpPr>
-            <a:spLocks noGrp="1"/>
-          </p:cNvSpPr>
-          <p:nvPr>
-            <p:ph type="title"/>
-          </p:nvPr>
-        </p:nvSpPr>
-        <p:spPr/>
-        <p:txBody>
-          <a:bodyPr/>
-          <a:lstStyle/>
-          <a:p>
-            <a:r>
-              <a:rPr lang="es-MX" dirty="0"/>
-              <a:t>Recomendaciones al programar</a:t>
-            </a:r>
-            <a:endParaRPr lang="es-CO" dirty="0"/>
-          </a:p>
-        </p:txBody>
-      </p:sp>
-      <p:sp>
-        <p:nvSpPr>
-          <p:cNvPr id="9" name="Marcador de contenido 8">
-            <a:extLst>
-              <a:ext uri="{FF2B5EF4-FFF2-40B4-BE49-F238E27FC236}">
-                <a16:creationId xmlns:a16="http://schemas.microsoft.com/office/drawing/2014/main" id="{0E89874D-BF35-D080-7E5D-1878BF1BD020}"/>
-              </a:ext>
-            </a:extLst>
-          </p:cNvPr>
-          <p:cNvSpPr>
-            <a:spLocks noGrp="1"/>
-          </p:cNvSpPr>
-          <p:nvPr>
-            <p:ph idx="1"/>
-          </p:nvPr>
-        </p:nvSpPr>
-        <p:spPr/>
-        <p:txBody>
-          <a:bodyPr/>
-          <a:lstStyle/>
-          <a:p>
-            <a:endParaRPr lang="es-CO"/>
-          </a:p>
-        </p:txBody>
-      </p:sp>
-      <p:sp>
-        <p:nvSpPr>
-          <p:cNvPr id="12" name="Forma libre: forma 11">
-            <a:extLst>
-              <a:ext uri="{FF2B5EF4-FFF2-40B4-BE49-F238E27FC236}">
-                <a16:creationId xmlns:a16="http://schemas.microsoft.com/office/drawing/2014/main" id="{9EE892CE-1E8F-03BD-7559-EB627E3E1434}"/>
-              </a:ext>
-            </a:extLst>
-          </p:cNvPr>
-          <p:cNvSpPr/>
-          <p:nvPr/>
-        </p:nvSpPr>
-        <p:spPr>
-          <a:xfrm>
-            <a:off x="0" y="98260"/>
-            <a:ext cx="1896643" cy="940484"/>
-          </a:xfrm>
-          <a:custGeom>
-            <a:avLst/>
-            <a:gdLst>
-              <a:gd name="connsiteX0" fmla="*/ 0 w 1724221"/>
-              <a:gd name="connsiteY0" fmla="*/ 0 h 1034532"/>
-              <a:gd name="connsiteX1" fmla="*/ 1724221 w 1724221"/>
-              <a:gd name="connsiteY1" fmla="*/ 0 h 1034532"/>
-              <a:gd name="connsiteX2" fmla="*/ 1724221 w 1724221"/>
-              <a:gd name="connsiteY2" fmla="*/ 1034532 h 1034532"/>
-              <a:gd name="connsiteX3" fmla="*/ 0 w 1724221"/>
-              <a:gd name="connsiteY3" fmla="*/ 1034532 h 1034532"/>
-              <a:gd name="connsiteX4" fmla="*/ 0 w 1724221"/>
-              <a:gd name="connsiteY4" fmla="*/ 0 h 1034532"/>
-            </a:gdLst>
-            <a:ahLst/>
-            <a:cxnLst>
-              <a:cxn ang="0">
-                <a:pos x="connsiteX0" y="connsiteY0"/>
-              </a:cxn>
-              <a:cxn ang="0">
-                <a:pos x="connsiteX1" y="connsiteY1"/>
-              </a:cxn>
-              <a:cxn ang="0">
-                <a:pos x="connsiteX2" y="connsiteY2"/>
-              </a:cxn>
-              <a:cxn ang="0">
-                <a:pos x="connsiteX3" y="connsiteY3"/>
-              </a:cxn>
-              <a:cxn ang="0">
-                <a:pos x="connsiteX4" y="connsiteY4"/>
-              </a:cxn>
-            </a:cxnLst>
-            <a:rect l="l" t="t" r="r" b="b"/>
-            <a:pathLst>
-              <a:path w="1724221" h="1034532">
-                <a:moveTo>
-                  <a:pt x="0" y="0"/>
-                </a:moveTo>
-                <a:lnTo>
-                  <a:pt x="1724221" y="0"/>
-                </a:lnTo>
-                <a:lnTo>
-                  <a:pt x="1724221" y="1034532"/>
-                </a:lnTo>
-                <a:lnTo>
-                  <a:pt x="0" y="1034532"/>
-                </a:lnTo>
-                <a:lnTo>
-                  <a:pt x="0" y="0"/>
-                </a:lnTo>
-                <a:close/>
-              </a:path>
-            </a:pathLst>
-          </a:custGeom>
-          <a:solidFill>
-            <a:schemeClr val="accent1">
-              <a:alpha val="20000"/>
-            </a:schemeClr>
-          </a:solidFill>
-          <a:ln>
-            <a:noFill/>
-          </a:ln>
-        </p:spPr>
-        <p:style>
-          <a:lnRef idx="2">
-            <a:schemeClr val="lt1">
-              <a:hueOff val="0"/>
-              <a:satOff val="0"/>
-              <a:lumOff val="0"/>
-              <a:alphaOff val="0"/>
-            </a:schemeClr>
-          </a:lnRef>
-          <a:fillRef idx="1">
-            <a:schemeClr val="accent4">
-              <a:hueOff val="0"/>
-              <a:satOff val="0"/>
-              <a:lumOff val="0"/>
-              <a:alphaOff val="0"/>
-            </a:schemeClr>
-          </a:fillRef>
-          <a:effectRef idx="0">
-            <a:schemeClr val="accent4">
-              <a:hueOff val="0"/>
-              <a:satOff val="0"/>
-              <a:lumOff val="0"/>
-              <a:alphaOff val="0"/>
-            </a:schemeClr>
-          </a:effectRef>
-          <a:fontRef idx="minor">
-            <a:schemeClr val="lt1"/>
-          </a:fontRef>
-        </p:style>
-        <p:txBody>
-          <a:bodyPr spcFirstLastPara="0" vert="horz" wrap="square" lIns="76200" tIns="76200" rIns="76200" bIns="76200" numCol="1" spcCol="1270" anchor="ctr" anchorCtr="0">
-            <a:noAutofit/>
-          </a:bodyPr>
-          <a:lstStyle/>
-          <a:p>
-            <a:pPr marL="0" lvl="0" indent="0" algn="ctr" defTabSz="889000">
-              <a:lnSpc>
-                <a:spcPct val="90000"/>
-              </a:lnSpc>
-              <a:spcBef>
-                <a:spcPct val="0"/>
-              </a:spcBef>
-              <a:spcAft>
-                <a:spcPct val="35000"/>
-              </a:spcAft>
-              <a:buNone/>
-            </a:pPr>
-            <a:r>
-              <a:rPr lang="es-MX" sz="2000" b="1" kern="1200" dirty="0"/>
-              <a:t>Diseño de código</a:t>
-            </a:r>
-            <a:endParaRPr lang="es-CO" sz="2000" b="1" kern="1200" dirty="0"/>
-          </a:p>
-        </p:txBody>
-      </p:sp>
-      <p:sp>
-        <p:nvSpPr>
-          <p:cNvPr id="13" name="Forma libre: forma 12">
-            <a:extLst>
-              <a:ext uri="{FF2B5EF4-FFF2-40B4-BE49-F238E27FC236}">
-                <a16:creationId xmlns:a16="http://schemas.microsoft.com/office/drawing/2014/main" id="{4398B382-3CA1-6CF5-ABC3-25D90C0CA9E6}"/>
-              </a:ext>
-            </a:extLst>
-          </p:cNvPr>
-          <p:cNvSpPr/>
-          <p:nvPr/>
-        </p:nvSpPr>
-        <p:spPr>
-          <a:xfrm>
-            <a:off x="0" y="1038438"/>
-            <a:ext cx="1896643" cy="940484"/>
-          </a:xfrm>
-          <a:custGeom>
-            <a:avLst/>
-            <a:gdLst>
-              <a:gd name="connsiteX0" fmla="*/ 0 w 1724221"/>
-              <a:gd name="connsiteY0" fmla="*/ 0 h 1034532"/>
-              <a:gd name="connsiteX1" fmla="*/ 1724221 w 1724221"/>
-              <a:gd name="connsiteY1" fmla="*/ 0 h 1034532"/>
-              <a:gd name="connsiteX2" fmla="*/ 1724221 w 1724221"/>
-              <a:gd name="connsiteY2" fmla="*/ 1034532 h 1034532"/>
-              <a:gd name="connsiteX3" fmla="*/ 0 w 1724221"/>
-              <a:gd name="connsiteY3" fmla="*/ 1034532 h 1034532"/>
-              <a:gd name="connsiteX4" fmla="*/ 0 w 1724221"/>
-              <a:gd name="connsiteY4" fmla="*/ 0 h 1034532"/>
-            </a:gdLst>
-            <a:ahLst/>
-            <a:cxnLst>
-              <a:cxn ang="0">
-                <a:pos x="connsiteX0" y="connsiteY0"/>
-              </a:cxn>
-              <a:cxn ang="0">
-                <a:pos x="connsiteX1" y="connsiteY1"/>
-              </a:cxn>
-              <a:cxn ang="0">
-                <a:pos x="connsiteX2" y="connsiteY2"/>
-              </a:cxn>
-              <a:cxn ang="0">
-                <a:pos x="connsiteX3" y="connsiteY3"/>
-              </a:cxn>
-              <a:cxn ang="0">
-                <a:pos x="connsiteX4" y="connsiteY4"/>
-              </a:cxn>
-            </a:cxnLst>
-            <a:rect l="l" t="t" r="r" b="b"/>
-            <a:pathLst>
-              <a:path w="1724221" h="1034532">
-                <a:moveTo>
-                  <a:pt x="0" y="0"/>
-                </a:moveTo>
-                <a:lnTo>
-                  <a:pt x="1724221" y="0"/>
-                </a:lnTo>
-                <a:lnTo>
-                  <a:pt x="1724221" y="1034532"/>
-                </a:lnTo>
-                <a:lnTo>
-                  <a:pt x="0" y="1034532"/>
-                </a:lnTo>
-                <a:lnTo>
-                  <a:pt x="0" y="0"/>
-                </a:lnTo>
-                <a:close/>
-              </a:path>
-            </a:pathLst>
-          </a:custGeom>
-          <a:solidFill>
-            <a:schemeClr val="accent1">
-              <a:alpha val="20000"/>
-            </a:schemeClr>
-          </a:solidFill>
-          <a:ln>
-            <a:noFill/>
-          </a:ln>
-        </p:spPr>
-        <p:style>
-          <a:lnRef idx="2">
-            <a:schemeClr val="lt1">
-              <a:hueOff val="0"/>
-              <a:satOff val="0"/>
-              <a:lumOff val="0"/>
-              <a:alphaOff val="0"/>
-            </a:schemeClr>
-          </a:lnRef>
-          <a:fillRef idx="1">
-            <a:schemeClr val="accent4">
-              <a:hueOff val="-892954"/>
-              <a:satOff val="5380"/>
-              <a:lumOff val="431"/>
-              <a:alphaOff val="0"/>
-            </a:schemeClr>
-          </a:fillRef>
-          <a:effectRef idx="0">
-            <a:schemeClr val="accent4">
-              <a:hueOff val="-892954"/>
-              <a:satOff val="5380"/>
-              <a:lumOff val="431"/>
-              <a:alphaOff val="0"/>
-            </a:schemeClr>
-          </a:effectRef>
-          <a:fontRef idx="minor">
-            <a:schemeClr val="lt1"/>
-          </a:fontRef>
-        </p:style>
-        <p:txBody>
-          <a:bodyPr spcFirstLastPara="0" vert="horz" wrap="square" lIns="76200" tIns="76200" rIns="76200" bIns="76200" numCol="1" spcCol="1270" anchor="ctr" anchorCtr="0">
-            <a:noAutofit/>
-          </a:bodyPr>
-          <a:lstStyle/>
-          <a:p>
-            <a:pPr marL="0" lvl="0" indent="0" algn="ctr" defTabSz="889000">
-              <a:lnSpc>
-                <a:spcPct val="90000"/>
-              </a:lnSpc>
-              <a:spcBef>
-                <a:spcPct val="0"/>
-              </a:spcBef>
-              <a:spcAft>
-                <a:spcPct val="35000"/>
-              </a:spcAft>
-              <a:buNone/>
-            </a:pPr>
-            <a:r>
-              <a:rPr lang="es-MX" sz="2000" b="1" kern="1200" dirty="0"/>
-              <a:t>Espacios en blanco</a:t>
-            </a:r>
-            <a:endParaRPr lang="es-CO" sz="2000" b="1" kern="1200" dirty="0"/>
-          </a:p>
-        </p:txBody>
-      </p:sp>
-      <p:sp>
-        <p:nvSpPr>
-          <p:cNvPr id="14" name="Forma libre: forma 13">
-            <a:extLst>
-              <a:ext uri="{FF2B5EF4-FFF2-40B4-BE49-F238E27FC236}">
-                <a16:creationId xmlns:a16="http://schemas.microsoft.com/office/drawing/2014/main" id="{4E855BA1-2E86-D90B-DAE5-412CD2AB8209}"/>
-              </a:ext>
-            </a:extLst>
-          </p:cNvPr>
-          <p:cNvSpPr/>
-          <p:nvPr/>
-        </p:nvSpPr>
-        <p:spPr>
-          <a:xfrm>
-            <a:off x="0" y="1979228"/>
-            <a:ext cx="1896643" cy="940484"/>
-          </a:xfrm>
-          <a:custGeom>
-            <a:avLst/>
-            <a:gdLst>
-              <a:gd name="connsiteX0" fmla="*/ 0 w 1724221"/>
-              <a:gd name="connsiteY0" fmla="*/ 0 h 1034532"/>
-              <a:gd name="connsiteX1" fmla="*/ 1724221 w 1724221"/>
-              <a:gd name="connsiteY1" fmla="*/ 0 h 1034532"/>
-              <a:gd name="connsiteX2" fmla="*/ 1724221 w 1724221"/>
-              <a:gd name="connsiteY2" fmla="*/ 1034532 h 1034532"/>
-              <a:gd name="connsiteX3" fmla="*/ 0 w 1724221"/>
-              <a:gd name="connsiteY3" fmla="*/ 1034532 h 1034532"/>
-              <a:gd name="connsiteX4" fmla="*/ 0 w 1724221"/>
-              <a:gd name="connsiteY4" fmla="*/ 0 h 1034532"/>
-            </a:gdLst>
-            <a:ahLst/>
-            <a:cxnLst>
-              <a:cxn ang="0">
-                <a:pos x="connsiteX0" y="connsiteY0"/>
-              </a:cxn>
-              <a:cxn ang="0">
-                <a:pos x="connsiteX1" y="connsiteY1"/>
-              </a:cxn>
-              <a:cxn ang="0">
-                <a:pos x="connsiteX2" y="connsiteY2"/>
-              </a:cxn>
-              <a:cxn ang="0">
-                <a:pos x="connsiteX3" y="connsiteY3"/>
-              </a:cxn>
-              <a:cxn ang="0">
-                <a:pos x="connsiteX4" y="connsiteY4"/>
-              </a:cxn>
-            </a:cxnLst>
-            <a:rect l="l" t="t" r="r" b="b"/>
-            <a:pathLst>
-              <a:path w="1724221" h="1034532">
-                <a:moveTo>
-                  <a:pt x="0" y="0"/>
-                </a:moveTo>
-                <a:lnTo>
-                  <a:pt x="1724221" y="0"/>
-                </a:lnTo>
-                <a:lnTo>
-                  <a:pt x="1724221" y="1034532"/>
-                </a:lnTo>
-                <a:lnTo>
-                  <a:pt x="0" y="1034532"/>
-                </a:lnTo>
-                <a:lnTo>
-                  <a:pt x="0" y="0"/>
-                </a:lnTo>
-                <a:close/>
-              </a:path>
-            </a:pathLst>
-          </a:custGeom>
-          <a:solidFill>
-            <a:schemeClr val="accent1">
-              <a:alpha val="20000"/>
-            </a:schemeClr>
-          </a:solidFill>
-          <a:ln>
-            <a:noFill/>
-          </a:ln>
-        </p:spPr>
-        <p:style>
-          <a:lnRef idx="2">
-            <a:schemeClr val="lt1">
-              <a:hueOff val="0"/>
-              <a:satOff val="0"/>
-              <a:lumOff val="0"/>
-              <a:alphaOff val="0"/>
-            </a:schemeClr>
-          </a:lnRef>
-          <a:fillRef idx="1">
-            <a:schemeClr val="accent4">
-              <a:hueOff val="-1785908"/>
-              <a:satOff val="10760"/>
-              <a:lumOff val="862"/>
-              <a:alphaOff val="0"/>
-            </a:schemeClr>
-          </a:fillRef>
-          <a:effectRef idx="0">
-            <a:schemeClr val="accent4">
-              <a:hueOff val="-1785908"/>
-              <a:satOff val="10760"/>
-              <a:lumOff val="862"/>
-              <a:alphaOff val="0"/>
-            </a:schemeClr>
-          </a:effectRef>
-          <a:fontRef idx="minor">
-            <a:schemeClr val="lt1"/>
-          </a:fontRef>
-        </p:style>
-        <p:txBody>
-          <a:bodyPr spcFirstLastPara="0" vert="horz" wrap="square" lIns="76200" tIns="76200" rIns="76200" bIns="76200" numCol="1" spcCol="1270" anchor="ctr" anchorCtr="0">
-            <a:noAutofit/>
-          </a:bodyPr>
-          <a:lstStyle/>
-          <a:p>
-            <a:pPr marL="0" lvl="0" indent="0" algn="ctr" defTabSz="889000">
-              <a:lnSpc>
-                <a:spcPct val="90000"/>
-              </a:lnSpc>
-              <a:spcBef>
-                <a:spcPct val="0"/>
-              </a:spcBef>
-              <a:spcAft>
-                <a:spcPct val="35000"/>
-              </a:spcAft>
-              <a:buNone/>
-            </a:pPr>
-            <a:r>
-              <a:rPr lang="es-MX" sz="2000" b="1" kern="1200" dirty="0"/>
-              <a:t>Uso de comas</a:t>
-            </a:r>
-            <a:endParaRPr lang="es-CO" sz="2000" b="1" kern="1200" dirty="0"/>
-          </a:p>
-        </p:txBody>
-      </p:sp>
-      <p:sp>
-        <p:nvSpPr>
-          <p:cNvPr id="15" name="Forma libre: forma 14">
-            <a:extLst>
-              <a:ext uri="{FF2B5EF4-FFF2-40B4-BE49-F238E27FC236}">
-                <a16:creationId xmlns:a16="http://schemas.microsoft.com/office/drawing/2014/main" id="{F79C7960-AAA9-6B61-7465-A9652CE96BB7}"/>
-              </a:ext>
-            </a:extLst>
-          </p:cNvPr>
-          <p:cNvSpPr/>
-          <p:nvPr/>
-        </p:nvSpPr>
-        <p:spPr>
-          <a:xfrm>
-            <a:off x="0" y="2919712"/>
-            <a:ext cx="1896643" cy="940484"/>
-          </a:xfrm>
-          <a:custGeom>
-            <a:avLst/>
-            <a:gdLst>
-              <a:gd name="connsiteX0" fmla="*/ 0 w 1724221"/>
-              <a:gd name="connsiteY0" fmla="*/ 0 h 1034532"/>
-              <a:gd name="connsiteX1" fmla="*/ 1724221 w 1724221"/>
-              <a:gd name="connsiteY1" fmla="*/ 0 h 1034532"/>
-              <a:gd name="connsiteX2" fmla="*/ 1724221 w 1724221"/>
-              <a:gd name="connsiteY2" fmla="*/ 1034532 h 1034532"/>
-              <a:gd name="connsiteX3" fmla="*/ 0 w 1724221"/>
-              <a:gd name="connsiteY3" fmla="*/ 1034532 h 1034532"/>
-              <a:gd name="connsiteX4" fmla="*/ 0 w 1724221"/>
-              <a:gd name="connsiteY4" fmla="*/ 0 h 1034532"/>
-            </a:gdLst>
-            <a:ahLst/>
-            <a:cxnLst>
-              <a:cxn ang="0">
-                <a:pos x="connsiteX0" y="connsiteY0"/>
-              </a:cxn>
-              <a:cxn ang="0">
-                <a:pos x="connsiteX1" y="connsiteY1"/>
-              </a:cxn>
-              <a:cxn ang="0">
-                <a:pos x="connsiteX2" y="connsiteY2"/>
-              </a:cxn>
-              <a:cxn ang="0">
-                <a:pos x="connsiteX3" y="connsiteY3"/>
-              </a:cxn>
-              <a:cxn ang="0">
-                <a:pos x="connsiteX4" y="connsiteY4"/>
-              </a:cxn>
-            </a:cxnLst>
-            <a:rect l="l" t="t" r="r" b="b"/>
-            <a:pathLst>
-              <a:path w="1724221" h="1034532">
-                <a:moveTo>
-                  <a:pt x="0" y="0"/>
-                </a:moveTo>
-                <a:lnTo>
-                  <a:pt x="1724221" y="0"/>
-                </a:lnTo>
-                <a:lnTo>
-                  <a:pt x="1724221" y="1034532"/>
-                </a:lnTo>
-                <a:lnTo>
-                  <a:pt x="0" y="1034532"/>
-                </a:lnTo>
-                <a:lnTo>
-                  <a:pt x="0" y="0"/>
-                </a:lnTo>
-                <a:close/>
-              </a:path>
-            </a:pathLst>
-          </a:custGeom>
-          <a:solidFill>
-            <a:schemeClr val="accent1">
-              <a:alpha val="20000"/>
-            </a:schemeClr>
-          </a:solidFill>
-          <a:ln>
-            <a:noFill/>
-          </a:ln>
-        </p:spPr>
-        <p:style>
-          <a:lnRef idx="2">
-            <a:schemeClr val="lt1">
-              <a:hueOff val="0"/>
-              <a:satOff val="0"/>
-              <a:lumOff val="0"/>
-              <a:alphaOff val="0"/>
-            </a:schemeClr>
-          </a:lnRef>
-          <a:fillRef idx="1">
-            <a:schemeClr val="accent4">
-              <a:hueOff val="-2678862"/>
-              <a:satOff val="16139"/>
-              <a:lumOff val="1294"/>
-              <a:alphaOff val="0"/>
-            </a:schemeClr>
-          </a:fillRef>
-          <a:effectRef idx="0">
-            <a:schemeClr val="accent4">
-              <a:hueOff val="-2678862"/>
-              <a:satOff val="16139"/>
-              <a:lumOff val="1294"/>
-              <a:alphaOff val="0"/>
-            </a:schemeClr>
-          </a:effectRef>
-          <a:fontRef idx="minor">
-            <a:schemeClr val="lt1"/>
-          </a:fontRef>
-        </p:style>
-        <p:txBody>
-          <a:bodyPr spcFirstLastPara="0" vert="horz" wrap="square" lIns="76200" tIns="76200" rIns="76200" bIns="76200" numCol="1" spcCol="1270" anchor="ctr" anchorCtr="0">
-            <a:noAutofit/>
-          </a:bodyPr>
-          <a:lstStyle/>
-          <a:p>
-            <a:pPr marL="0" lvl="0" indent="0" algn="ctr" defTabSz="889000">
-              <a:lnSpc>
-                <a:spcPct val="90000"/>
-              </a:lnSpc>
-              <a:spcBef>
-                <a:spcPct val="0"/>
-              </a:spcBef>
-              <a:spcAft>
-                <a:spcPct val="35000"/>
-              </a:spcAft>
-              <a:buNone/>
-            </a:pPr>
-            <a:r>
-              <a:rPr lang="es-MX" sz="2000" b="1" kern="1200" dirty="0"/>
-              <a:t>Comentarios</a:t>
-            </a:r>
-            <a:endParaRPr lang="es-CO" sz="2000" b="1" kern="1200" dirty="0"/>
-          </a:p>
-        </p:txBody>
-      </p:sp>
-      <p:sp>
-        <p:nvSpPr>
-          <p:cNvPr id="16" name="Forma libre: forma 15">
-            <a:extLst>
-              <a:ext uri="{FF2B5EF4-FFF2-40B4-BE49-F238E27FC236}">
-                <a16:creationId xmlns:a16="http://schemas.microsoft.com/office/drawing/2014/main" id="{D6FF85AA-A80F-63E4-56C6-32CAF1DD8AAB}"/>
-              </a:ext>
-            </a:extLst>
-          </p:cNvPr>
-          <p:cNvSpPr/>
-          <p:nvPr/>
-        </p:nvSpPr>
-        <p:spPr>
-          <a:xfrm>
-            <a:off x="0" y="3860196"/>
-            <a:ext cx="1896643" cy="940484"/>
-          </a:xfrm>
-          <a:custGeom>
-            <a:avLst/>
-            <a:gdLst>
-              <a:gd name="connsiteX0" fmla="*/ 0 w 1724221"/>
-              <a:gd name="connsiteY0" fmla="*/ 0 h 1034532"/>
-              <a:gd name="connsiteX1" fmla="*/ 1724221 w 1724221"/>
-              <a:gd name="connsiteY1" fmla="*/ 0 h 1034532"/>
-              <a:gd name="connsiteX2" fmla="*/ 1724221 w 1724221"/>
-              <a:gd name="connsiteY2" fmla="*/ 1034532 h 1034532"/>
-              <a:gd name="connsiteX3" fmla="*/ 0 w 1724221"/>
-              <a:gd name="connsiteY3" fmla="*/ 1034532 h 1034532"/>
-              <a:gd name="connsiteX4" fmla="*/ 0 w 1724221"/>
-              <a:gd name="connsiteY4" fmla="*/ 0 h 1034532"/>
-            </a:gdLst>
-            <a:ahLst/>
-            <a:cxnLst>
-              <a:cxn ang="0">
-                <a:pos x="connsiteX0" y="connsiteY0"/>
-              </a:cxn>
-              <a:cxn ang="0">
-                <a:pos x="connsiteX1" y="connsiteY1"/>
-              </a:cxn>
-              <a:cxn ang="0">
-                <a:pos x="connsiteX2" y="connsiteY2"/>
-              </a:cxn>
-              <a:cxn ang="0">
-                <a:pos x="connsiteX3" y="connsiteY3"/>
-              </a:cxn>
-              <a:cxn ang="0">
-                <a:pos x="connsiteX4" y="connsiteY4"/>
-              </a:cxn>
-            </a:cxnLst>
-            <a:rect l="l" t="t" r="r" b="b"/>
-            <a:pathLst>
-              <a:path w="1724221" h="1034532">
-                <a:moveTo>
-                  <a:pt x="0" y="0"/>
-                </a:moveTo>
-                <a:lnTo>
-                  <a:pt x="1724221" y="0"/>
-                </a:lnTo>
-                <a:lnTo>
-                  <a:pt x="1724221" y="1034532"/>
-                </a:lnTo>
-                <a:lnTo>
-                  <a:pt x="0" y="1034532"/>
-                </a:lnTo>
-                <a:lnTo>
-                  <a:pt x="0" y="0"/>
-                </a:lnTo>
-                <a:close/>
-              </a:path>
-            </a:pathLst>
-          </a:custGeom>
-          <a:solidFill>
-            <a:schemeClr val="accent1">
-              <a:alpha val="20000"/>
-            </a:schemeClr>
-          </a:solidFill>
-          <a:ln>
-            <a:noFill/>
-          </a:ln>
-        </p:spPr>
-        <p:style>
-          <a:lnRef idx="2">
-            <a:schemeClr val="lt1">
-              <a:hueOff val="0"/>
-              <a:satOff val="0"/>
-              <a:lumOff val="0"/>
-              <a:alphaOff val="0"/>
-            </a:schemeClr>
-          </a:lnRef>
-          <a:fillRef idx="1">
-            <a:schemeClr val="accent4">
-              <a:hueOff val="-3571816"/>
-              <a:satOff val="21519"/>
-              <a:lumOff val="1725"/>
-              <a:alphaOff val="0"/>
-            </a:schemeClr>
-          </a:fillRef>
-          <a:effectRef idx="0">
-            <a:schemeClr val="accent4">
-              <a:hueOff val="-3571816"/>
-              <a:satOff val="21519"/>
-              <a:lumOff val="1725"/>
-              <a:alphaOff val="0"/>
-            </a:schemeClr>
-          </a:effectRef>
-          <a:fontRef idx="minor">
-            <a:schemeClr val="lt1"/>
-          </a:fontRef>
-        </p:style>
-        <p:txBody>
-          <a:bodyPr spcFirstLastPara="0" vert="horz" wrap="square" lIns="76200" tIns="76200" rIns="76200" bIns="76200" numCol="1" spcCol="1270" anchor="ctr" anchorCtr="0">
-            <a:noAutofit/>
-          </a:bodyPr>
-          <a:lstStyle/>
-          <a:p>
-            <a:pPr marL="0" lvl="0" indent="0" algn="ctr" defTabSz="889000">
-              <a:lnSpc>
-                <a:spcPct val="90000"/>
-              </a:lnSpc>
-              <a:spcBef>
-                <a:spcPct val="0"/>
-              </a:spcBef>
-              <a:spcAft>
-                <a:spcPct val="35000"/>
-              </a:spcAft>
-              <a:buNone/>
-            </a:pPr>
-            <a:r>
-              <a:rPr lang="es-MX" sz="2000" b="1" kern="1200" dirty="0"/>
-              <a:t>Nombres de variables</a:t>
-            </a:r>
-            <a:endParaRPr lang="es-CO" sz="2000" b="1" kern="1200" dirty="0"/>
-          </a:p>
-        </p:txBody>
-      </p:sp>
-      <p:sp>
-        <p:nvSpPr>
-          <p:cNvPr id="17" name="Forma libre: forma 16">
-            <a:extLst>
-              <a:ext uri="{FF2B5EF4-FFF2-40B4-BE49-F238E27FC236}">
-                <a16:creationId xmlns:a16="http://schemas.microsoft.com/office/drawing/2014/main" id="{95527CA0-6267-B9A5-7CF0-22CD51FB9056}"/>
-              </a:ext>
-            </a:extLst>
-          </p:cNvPr>
-          <p:cNvSpPr/>
-          <p:nvPr/>
-        </p:nvSpPr>
-        <p:spPr>
-          <a:xfrm>
-            <a:off x="-1" y="4800680"/>
-            <a:ext cx="1896643" cy="940484"/>
-          </a:xfrm>
-          <a:custGeom>
-            <a:avLst/>
-            <a:gdLst>
-              <a:gd name="connsiteX0" fmla="*/ 0 w 1724221"/>
-              <a:gd name="connsiteY0" fmla="*/ 0 h 1034532"/>
-              <a:gd name="connsiteX1" fmla="*/ 1724221 w 1724221"/>
-              <a:gd name="connsiteY1" fmla="*/ 0 h 1034532"/>
-              <a:gd name="connsiteX2" fmla="*/ 1724221 w 1724221"/>
-              <a:gd name="connsiteY2" fmla="*/ 1034532 h 1034532"/>
-              <a:gd name="connsiteX3" fmla="*/ 0 w 1724221"/>
-              <a:gd name="connsiteY3" fmla="*/ 1034532 h 1034532"/>
-              <a:gd name="connsiteX4" fmla="*/ 0 w 1724221"/>
-              <a:gd name="connsiteY4" fmla="*/ 0 h 1034532"/>
-            </a:gdLst>
-            <a:ahLst/>
-            <a:cxnLst>
-              <a:cxn ang="0">
-                <a:pos x="connsiteX0" y="connsiteY0"/>
-              </a:cxn>
-              <a:cxn ang="0">
-                <a:pos x="connsiteX1" y="connsiteY1"/>
-              </a:cxn>
-              <a:cxn ang="0">
-                <a:pos x="connsiteX2" y="connsiteY2"/>
-              </a:cxn>
-              <a:cxn ang="0">
-                <a:pos x="connsiteX3" y="connsiteY3"/>
-              </a:cxn>
-              <a:cxn ang="0">
-                <a:pos x="connsiteX4" y="connsiteY4"/>
-              </a:cxn>
-            </a:cxnLst>
-            <a:rect l="l" t="t" r="r" b="b"/>
-            <a:pathLst>
-              <a:path w="1724221" h="1034532">
-                <a:moveTo>
-                  <a:pt x="0" y="0"/>
-                </a:moveTo>
-                <a:lnTo>
-                  <a:pt x="1724221" y="0"/>
-                </a:lnTo>
-                <a:lnTo>
-                  <a:pt x="1724221" y="1034532"/>
-                </a:lnTo>
-                <a:lnTo>
-                  <a:pt x="0" y="1034532"/>
-                </a:lnTo>
-                <a:lnTo>
-                  <a:pt x="0" y="0"/>
-                </a:lnTo>
-                <a:close/>
-              </a:path>
-            </a:pathLst>
-          </a:custGeom>
-          <a:ln>
-            <a:noFill/>
-          </a:ln>
-        </p:spPr>
-        <p:style>
-          <a:lnRef idx="2">
-            <a:schemeClr val="lt1">
-              <a:hueOff val="0"/>
-              <a:satOff val="0"/>
-              <a:lumOff val="0"/>
-              <a:alphaOff val="0"/>
-            </a:schemeClr>
-          </a:lnRef>
-          <a:fillRef idx="1">
-            <a:schemeClr val="accent4">
-              <a:hueOff val="-4464770"/>
-              <a:satOff val="26899"/>
-              <a:lumOff val="2156"/>
-              <a:alphaOff val="0"/>
-            </a:schemeClr>
-          </a:fillRef>
-          <a:effectRef idx="0">
-            <a:schemeClr val="accent4">
-              <a:hueOff val="-4464770"/>
-              <a:satOff val="26899"/>
-              <a:lumOff val="2156"/>
-              <a:alphaOff val="0"/>
-            </a:schemeClr>
-          </a:effectRef>
-          <a:fontRef idx="minor">
-            <a:schemeClr val="lt1"/>
-          </a:fontRef>
-        </p:style>
-        <p:txBody>
-          <a:bodyPr spcFirstLastPara="0" vert="horz" wrap="square" lIns="0" tIns="0" rIns="0" bIns="0" numCol="1" spcCol="1270" anchor="ctr" anchorCtr="0">
-            <a:noAutofit/>
-          </a:bodyPr>
-          <a:lstStyle/>
-          <a:p>
-            <a:pPr marL="0" lvl="0" indent="0" algn="ctr" defTabSz="755650">
-              <a:lnSpc>
-                <a:spcPct val="90000"/>
-              </a:lnSpc>
-              <a:spcBef>
-                <a:spcPct val="0"/>
-              </a:spcBef>
-              <a:spcAft>
-                <a:spcPct val="35000"/>
-              </a:spcAft>
-              <a:buNone/>
-            </a:pPr>
-            <a:r>
-              <a:rPr lang="es-MX" sz="1700" b="1" kern="1200" dirty="0"/>
-              <a:t>Recomendaciones</a:t>
-            </a:r>
-            <a:r>
-              <a:rPr lang="es-MX" sz="2000" b="1" kern="1200" dirty="0"/>
-              <a:t> de programación</a:t>
-            </a:r>
-            <a:endParaRPr lang="es-CO" sz="2000" b="1" kern="1200" dirty="0"/>
-          </a:p>
-        </p:txBody>
-      </p:sp>
     </p:spTree>
     <p:extLst>
       <p:ext uri="{BB962C8B-B14F-4D97-AF65-F5344CB8AC3E}">
-        <p14:creationId xmlns:p14="http://schemas.microsoft.com/office/powerpoint/2010/main" val="3965756532"/>
+        <p14:creationId xmlns:p14="http://schemas.microsoft.com/office/powerpoint/2010/main" val="2810833794"/>
       </p:ext>
     </p:extLst>
   </p:cSld>
@@ -14507,7 +14155,7 @@
           <a:p>
             <a:r>
               <a:rPr lang="es-CO" sz="2400" dirty="0"/>
-              <a:t>Código: </a:t>
+              <a:t>Código:  2216745</a:t>
             </a:r>
           </a:p>
         </p:txBody>
@@ -14534,1935 +14182,6 @@
       </p:transition>
     </mc:Fallback>
   </mc:AlternateContent>
-</p:sld>
-</file>
-
-<file path=ppt/slides/slide20.xml><?xml version="1.0" encoding="utf-8"?>
-<p:sld xmlns:a="http://schemas.openxmlformats.org/drawingml/2006/main" xmlns:r="http://schemas.openxmlformats.org/officeDocument/2006/relationships" xmlns:p="http://schemas.openxmlformats.org/presentationml/2006/main">
-  <p:cSld>
-    <p:spTree>
-      <p:nvGrpSpPr>
-        <p:cNvPr id="1" name=""/>
-        <p:cNvGrpSpPr/>
-        <p:nvPr/>
-      </p:nvGrpSpPr>
-      <p:grpSpPr>
-        <a:xfrm>
-          <a:off x="0" y="0"/>
-          <a:ext cx="0" cy="0"/>
-          <a:chOff x="0" y="0"/>
-          <a:chExt cx="0" cy="0"/>
-        </a:xfrm>
-      </p:grpSpPr>
-      <p:sp>
-        <p:nvSpPr>
-          <p:cNvPr id="8" name="Título 7">
-            <a:extLst>
-              <a:ext uri="{FF2B5EF4-FFF2-40B4-BE49-F238E27FC236}">
-                <a16:creationId xmlns:a16="http://schemas.microsoft.com/office/drawing/2014/main" id="{C6BA3E19-8EA0-F3F8-B8DB-8D3D11BCADB7}"/>
-              </a:ext>
-            </a:extLst>
-          </p:cNvPr>
-          <p:cNvSpPr>
-            <a:spLocks noGrp="1"/>
-          </p:cNvSpPr>
-          <p:nvPr>
-            <p:ph type="title"/>
-          </p:nvPr>
-        </p:nvSpPr>
-        <p:spPr/>
-        <p:txBody>
-          <a:bodyPr/>
-          <a:lstStyle/>
-          <a:p>
-            <a:r>
-              <a:rPr lang="es-MX" dirty="0"/>
-              <a:t>Recomendaciones sobre funciones</a:t>
-            </a:r>
-            <a:endParaRPr lang="es-CO" dirty="0"/>
-          </a:p>
-        </p:txBody>
-      </p:sp>
-      <p:sp>
-        <p:nvSpPr>
-          <p:cNvPr id="9" name="Marcador de contenido 8">
-            <a:extLst>
-              <a:ext uri="{FF2B5EF4-FFF2-40B4-BE49-F238E27FC236}">
-                <a16:creationId xmlns:a16="http://schemas.microsoft.com/office/drawing/2014/main" id="{0E89874D-BF35-D080-7E5D-1878BF1BD020}"/>
-              </a:ext>
-            </a:extLst>
-          </p:cNvPr>
-          <p:cNvSpPr>
-            <a:spLocks noGrp="1"/>
-          </p:cNvSpPr>
-          <p:nvPr>
-            <p:ph idx="1"/>
-          </p:nvPr>
-        </p:nvSpPr>
-        <p:spPr/>
-        <p:txBody>
-          <a:bodyPr/>
-          <a:lstStyle/>
-          <a:p>
-            <a:endParaRPr lang="es-CO"/>
-          </a:p>
-        </p:txBody>
-      </p:sp>
-      <p:sp>
-        <p:nvSpPr>
-          <p:cNvPr id="12" name="Forma libre: forma 11">
-            <a:extLst>
-              <a:ext uri="{FF2B5EF4-FFF2-40B4-BE49-F238E27FC236}">
-                <a16:creationId xmlns:a16="http://schemas.microsoft.com/office/drawing/2014/main" id="{9EE892CE-1E8F-03BD-7559-EB627E3E1434}"/>
-              </a:ext>
-            </a:extLst>
-          </p:cNvPr>
-          <p:cNvSpPr/>
-          <p:nvPr/>
-        </p:nvSpPr>
-        <p:spPr>
-          <a:xfrm>
-            <a:off x="0" y="98260"/>
-            <a:ext cx="1896643" cy="940484"/>
-          </a:xfrm>
-          <a:custGeom>
-            <a:avLst/>
-            <a:gdLst>
-              <a:gd name="connsiteX0" fmla="*/ 0 w 1724221"/>
-              <a:gd name="connsiteY0" fmla="*/ 0 h 1034532"/>
-              <a:gd name="connsiteX1" fmla="*/ 1724221 w 1724221"/>
-              <a:gd name="connsiteY1" fmla="*/ 0 h 1034532"/>
-              <a:gd name="connsiteX2" fmla="*/ 1724221 w 1724221"/>
-              <a:gd name="connsiteY2" fmla="*/ 1034532 h 1034532"/>
-              <a:gd name="connsiteX3" fmla="*/ 0 w 1724221"/>
-              <a:gd name="connsiteY3" fmla="*/ 1034532 h 1034532"/>
-              <a:gd name="connsiteX4" fmla="*/ 0 w 1724221"/>
-              <a:gd name="connsiteY4" fmla="*/ 0 h 1034532"/>
-            </a:gdLst>
-            <a:ahLst/>
-            <a:cxnLst>
-              <a:cxn ang="0">
-                <a:pos x="connsiteX0" y="connsiteY0"/>
-              </a:cxn>
-              <a:cxn ang="0">
-                <a:pos x="connsiteX1" y="connsiteY1"/>
-              </a:cxn>
-              <a:cxn ang="0">
-                <a:pos x="connsiteX2" y="connsiteY2"/>
-              </a:cxn>
-              <a:cxn ang="0">
-                <a:pos x="connsiteX3" y="connsiteY3"/>
-              </a:cxn>
-              <a:cxn ang="0">
-                <a:pos x="connsiteX4" y="connsiteY4"/>
-              </a:cxn>
-            </a:cxnLst>
-            <a:rect l="l" t="t" r="r" b="b"/>
-            <a:pathLst>
-              <a:path w="1724221" h="1034532">
-                <a:moveTo>
-                  <a:pt x="0" y="0"/>
-                </a:moveTo>
-                <a:lnTo>
-                  <a:pt x="1724221" y="0"/>
-                </a:lnTo>
-                <a:lnTo>
-                  <a:pt x="1724221" y="1034532"/>
-                </a:lnTo>
-                <a:lnTo>
-                  <a:pt x="0" y="1034532"/>
-                </a:lnTo>
-                <a:lnTo>
-                  <a:pt x="0" y="0"/>
-                </a:lnTo>
-                <a:close/>
-              </a:path>
-            </a:pathLst>
-          </a:custGeom>
-          <a:solidFill>
-            <a:schemeClr val="accent1">
-              <a:alpha val="20000"/>
-            </a:schemeClr>
-          </a:solidFill>
-          <a:ln>
-            <a:noFill/>
-          </a:ln>
-        </p:spPr>
-        <p:style>
-          <a:lnRef idx="2">
-            <a:schemeClr val="lt1">
-              <a:hueOff val="0"/>
-              <a:satOff val="0"/>
-              <a:lumOff val="0"/>
-              <a:alphaOff val="0"/>
-            </a:schemeClr>
-          </a:lnRef>
-          <a:fillRef idx="1">
-            <a:schemeClr val="accent4">
-              <a:hueOff val="0"/>
-              <a:satOff val="0"/>
-              <a:lumOff val="0"/>
-              <a:alphaOff val="0"/>
-            </a:schemeClr>
-          </a:fillRef>
-          <a:effectRef idx="0">
-            <a:schemeClr val="accent4">
-              <a:hueOff val="0"/>
-              <a:satOff val="0"/>
-              <a:lumOff val="0"/>
-              <a:alphaOff val="0"/>
-            </a:schemeClr>
-          </a:effectRef>
-          <a:fontRef idx="minor">
-            <a:schemeClr val="lt1"/>
-          </a:fontRef>
-        </p:style>
-        <p:txBody>
-          <a:bodyPr spcFirstLastPara="0" vert="horz" wrap="square" lIns="76200" tIns="76200" rIns="76200" bIns="76200" numCol="1" spcCol="1270" anchor="ctr" anchorCtr="0">
-            <a:noAutofit/>
-          </a:bodyPr>
-          <a:lstStyle/>
-          <a:p>
-            <a:pPr marL="0" lvl="0" indent="0" algn="ctr" defTabSz="889000">
-              <a:lnSpc>
-                <a:spcPct val="90000"/>
-              </a:lnSpc>
-              <a:spcBef>
-                <a:spcPct val="0"/>
-              </a:spcBef>
-              <a:spcAft>
-                <a:spcPct val="35000"/>
-              </a:spcAft>
-              <a:buNone/>
-            </a:pPr>
-            <a:r>
-              <a:rPr lang="es-MX" sz="2000" b="1" kern="1200" dirty="0"/>
-              <a:t>Diseño de código</a:t>
-            </a:r>
-            <a:endParaRPr lang="es-CO" sz="2000" b="1" kern="1200" dirty="0"/>
-          </a:p>
-        </p:txBody>
-      </p:sp>
-      <p:sp>
-        <p:nvSpPr>
-          <p:cNvPr id="13" name="Forma libre: forma 12">
-            <a:extLst>
-              <a:ext uri="{FF2B5EF4-FFF2-40B4-BE49-F238E27FC236}">
-                <a16:creationId xmlns:a16="http://schemas.microsoft.com/office/drawing/2014/main" id="{4398B382-3CA1-6CF5-ABC3-25D90C0CA9E6}"/>
-              </a:ext>
-            </a:extLst>
-          </p:cNvPr>
-          <p:cNvSpPr/>
-          <p:nvPr/>
-        </p:nvSpPr>
-        <p:spPr>
-          <a:xfrm>
-            <a:off x="0" y="1038438"/>
-            <a:ext cx="1896643" cy="940484"/>
-          </a:xfrm>
-          <a:custGeom>
-            <a:avLst/>
-            <a:gdLst>
-              <a:gd name="connsiteX0" fmla="*/ 0 w 1724221"/>
-              <a:gd name="connsiteY0" fmla="*/ 0 h 1034532"/>
-              <a:gd name="connsiteX1" fmla="*/ 1724221 w 1724221"/>
-              <a:gd name="connsiteY1" fmla="*/ 0 h 1034532"/>
-              <a:gd name="connsiteX2" fmla="*/ 1724221 w 1724221"/>
-              <a:gd name="connsiteY2" fmla="*/ 1034532 h 1034532"/>
-              <a:gd name="connsiteX3" fmla="*/ 0 w 1724221"/>
-              <a:gd name="connsiteY3" fmla="*/ 1034532 h 1034532"/>
-              <a:gd name="connsiteX4" fmla="*/ 0 w 1724221"/>
-              <a:gd name="connsiteY4" fmla="*/ 0 h 1034532"/>
-            </a:gdLst>
-            <a:ahLst/>
-            <a:cxnLst>
-              <a:cxn ang="0">
-                <a:pos x="connsiteX0" y="connsiteY0"/>
-              </a:cxn>
-              <a:cxn ang="0">
-                <a:pos x="connsiteX1" y="connsiteY1"/>
-              </a:cxn>
-              <a:cxn ang="0">
-                <a:pos x="connsiteX2" y="connsiteY2"/>
-              </a:cxn>
-              <a:cxn ang="0">
-                <a:pos x="connsiteX3" y="connsiteY3"/>
-              </a:cxn>
-              <a:cxn ang="0">
-                <a:pos x="connsiteX4" y="connsiteY4"/>
-              </a:cxn>
-            </a:cxnLst>
-            <a:rect l="l" t="t" r="r" b="b"/>
-            <a:pathLst>
-              <a:path w="1724221" h="1034532">
-                <a:moveTo>
-                  <a:pt x="0" y="0"/>
-                </a:moveTo>
-                <a:lnTo>
-                  <a:pt x="1724221" y="0"/>
-                </a:lnTo>
-                <a:lnTo>
-                  <a:pt x="1724221" y="1034532"/>
-                </a:lnTo>
-                <a:lnTo>
-                  <a:pt x="0" y="1034532"/>
-                </a:lnTo>
-                <a:lnTo>
-                  <a:pt x="0" y="0"/>
-                </a:lnTo>
-                <a:close/>
-              </a:path>
-            </a:pathLst>
-          </a:custGeom>
-          <a:solidFill>
-            <a:schemeClr val="accent1">
-              <a:alpha val="20000"/>
-            </a:schemeClr>
-          </a:solidFill>
-          <a:ln>
-            <a:noFill/>
-          </a:ln>
-        </p:spPr>
-        <p:style>
-          <a:lnRef idx="2">
-            <a:schemeClr val="lt1">
-              <a:hueOff val="0"/>
-              <a:satOff val="0"/>
-              <a:lumOff val="0"/>
-              <a:alphaOff val="0"/>
-            </a:schemeClr>
-          </a:lnRef>
-          <a:fillRef idx="1">
-            <a:schemeClr val="accent4">
-              <a:hueOff val="-892954"/>
-              <a:satOff val="5380"/>
-              <a:lumOff val="431"/>
-              <a:alphaOff val="0"/>
-            </a:schemeClr>
-          </a:fillRef>
-          <a:effectRef idx="0">
-            <a:schemeClr val="accent4">
-              <a:hueOff val="-892954"/>
-              <a:satOff val="5380"/>
-              <a:lumOff val="431"/>
-              <a:alphaOff val="0"/>
-            </a:schemeClr>
-          </a:effectRef>
-          <a:fontRef idx="minor">
-            <a:schemeClr val="lt1"/>
-          </a:fontRef>
-        </p:style>
-        <p:txBody>
-          <a:bodyPr spcFirstLastPara="0" vert="horz" wrap="square" lIns="76200" tIns="76200" rIns="76200" bIns="76200" numCol="1" spcCol="1270" anchor="ctr" anchorCtr="0">
-            <a:noAutofit/>
-          </a:bodyPr>
-          <a:lstStyle/>
-          <a:p>
-            <a:pPr marL="0" lvl="0" indent="0" algn="ctr" defTabSz="889000">
-              <a:lnSpc>
-                <a:spcPct val="90000"/>
-              </a:lnSpc>
-              <a:spcBef>
-                <a:spcPct val="0"/>
-              </a:spcBef>
-              <a:spcAft>
-                <a:spcPct val="35000"/>
-              </a:spcAft>
-              <a:buNone/>
-            </a:pPr>
-            <a:r>
-              <a:rPr lang="es-MX" sz="2000" b="1" kern="1200" dirty="0"/>
-              <a:t>Espacios en blanco</a:t>
-            </a:r>
-            <a:endParaRPr lang="es-CO" sz="2000" b="1" kern="1200" dirty="0"/>
-          </a:p>
-        </p:txBody>
-      </p:sp>
-      <p:sp>
-        <p:nvSpPr>
-          <p:cNvPr id="14" name="Forma libre: forma 13">
-            <a:extLst>
-              <a:ext uri="{FF2B5EF4-FFF2-40B4-BE49-F238E27FC236}">
-                <a16:creationId xmlns:a16="http://schemas.microsoft.com/office/drawing/2014/main" id="{4E855BA1-2E86-D90B-DAE5-412CD2AB8209}"/>
-              </a:ext>
-            </a:extLst>
-          </p:cNvPr>
-          <p:cNvSpPr/>
-          <p:nvPr/>
-        </p:nvSpPr>
-        <p:spPr>
-          <a:xfrm>
-            <a:off x="0" y="1979228"/>
-            <a:ext cx="1896643" cy="940484"/>
-          </a:xfrm>
-          <a:custGeom>
-            <a:avLst/>
-            <a:gdLst>
-              <a:gd name="connsiteX0" fmla="*/ 0 w 1724221"/>
-              <a:gd name="connsiteY0" fmla="*/ 0 h 1034532"/>
-              <a:gd name="connsiteX1" fmla="*/ 1724221 w 1724221"/>
-              <a:gd name="connsiteY1" fmla="*/ 0 h 1034532"/>
-              <a:gd name="connsiteX2" fmla="*/ 1724221 w 1724221"/>
-              <a:gd name="connsiteY2" fmla="*/ 1034532 h 1034532"/>
-              <a:gd name="connsiteX3" fmla="*/ 0 w 1724221"/>
-              <a:gd name="connsiteY3" fmla="*/ 1034532 h 1034532"/>
-              <a:gd name="connsiteX4" fmla="*/ 0 w 1724221"/>
-              <a:gd name="connsiteY4" fmla="*/ 0 h 1034532"/>
-            </a:gdLst>
-            <a:ahLst/>
-            <a:cxnLst>
-              <a:cxn ang="0">
-                <a:pos x="connsiteX0" y="connsiteY0"/>
-              </a:cxn>
-              <a:cxn ang="0">
-                <a:pos x="connsiteX1" y="connsiteY1"/>
-              </a:cxn>
-              <a:cxn ang="0">
-                <a:pos x="connsiteX2" y="connsiteY2"/>
-              </a:cxn>
-              <a:cxn ang="0">
-                <a:pos x="connsiteX3" y="connsiteY3"/>
-              </a:cxn>
-              <a:cxn ang="0">
-                <a:pos x="connsiteX4" y="connsiteY4"/>
-              </a:cxn>
-            </a:cxnLst>
-            <a:rect l="l" t="t" r="r" b="b"/>
-            <a:pathLst>
-              <a:path w="1724221" h="1034532">
-                <a:moveTo>
-                  <a:pt x="0" y="0"/>
-                </a:moveTo>
-                <a:lnTo>
-                  <a:pt x="1724221" y="0"/>
-                </a:lnTo>
-                <a:lnTo>
-                  <a:pt x="1724221" y="1034532"/>
-                </a:lnTo>
-                <a:lnTo>
-                  <a:pt x="0" y="1034532"/>
-                </a:lnTo>
-                <a:lnTo>
-                  <a:pt x="0" y="0"/>
-                </a:lnTo>
-                <a:close/>
-              </a:path>
-            </a:pathLst>
-          </a:custGeom>
-          <a:solidFill>
-            <a:schemeClr val="accent1">
-              <a:alpha val="20000"/>
-            </a:schemeClr>
-          </a:solidFill>
-          <a:ln>
-            <a:noFill/>
-          </a:ln>
-        </p:spPr>
-        <p:style>
-          <a:lnRef idx="2">
-            <a:schemeClr val="lt1">
-              <a:hueOff val="0"/>
-              <a:satOff val="0"/>
-              <a:lumOff val="0"/>
-              <a:alphaOff val="0"/>
-            </a:schemeClr>
-          </a:lnRef>
-          <a:fillRef idx="1">
-            <a:schemeClr val="accent4">
-              <a:hueOff val="-1785908"/>
-              <a:satOff val="10760"/>
-              <a:lumOff val="862"/>
-              <a:alphaOff val="0"/>
-            </a:schemeClr>
-          </a:fillRef>
-          <a:effectRef idx="0">
-            <a:schemeClr val="accent4">
-              <a:hueOff val="-1785908"/>
-              <a:satOff val="10760"/>
-              <a:lumOff val="862"/>
-              <a:alphaOff val="0"/>
-            </a:schemeClr>
-          </a:effectRef>
-          <a:fontRef idx="minor">
-            <a:schemeClr val="lt1"/>
-          </a:fontRef>
-        </p:style>
-        <p:txBody>
-          <a:bodyPr spcFirstLastPara="0" vert="horz" wrap="square" lIns="76200" tIns="76200" rIns="76200" bIns="76200" numCol="1" spcCol="1270" anchor="ctr" anchorCtr="0">
-            <a:noAutofit/>
-          </a:bodyPr>
-          <a:lstStyle/>
-          <a:p>
-            <a:pPr marL="0" lvl="0" indent="0" algn="ctr" defTabSz="889000">
-              <a:lnSpc>
-                <a:spcPct val="90000"/>
-              </a:lnSpc>
-              <a:spcBef>
-                <a:spcPct val="0"/>
-              </a:spcBef>
-              <a:spcAft>
-                <a:spcPct val="35000"/>
-              </a:spcAft>
-              <a:buNone/>
-            </a:pPr>
-            <a:r>
-              <a:rPr lang="es-MX" sz="2000" b="1" kern="1200" dirty="0"/>
-              <a:t>Uso de comas</a:t>
-            </a:r>
-            <a:endParaRPr lang="es-CO" sz="2000" b="1" kern="1200" dirty="0"/>
-          </a:p>
-        </p:txBody>
-      </p:sp>
-      <p:sp>
-        <p:nvSpPr>
-          <p:cNvPr id="15" name="Forma libre: forma 14">
-            <a:extLst>
-              <a:ext uri="{FF2B5EF4-FFF2-40B4-BE49-F238E27FC236}">
-                <a16:creationId xmlns:a16="http://schemas.microsoft.com/office/drawing/2014/main" id="{F79C7960-AAA9-6B61-7465-A9652CE96BB7}"/>
-              </a:ext>
-            </a:extLst>
-          </p:cNvPr>
-          <p:cNvSpPr/>
-          <p:nvPr/>
-        </p:nvSpPr>
-        <p:spPr>
-          <a:xfrm>
-            <a:off x="0" y="2919712"/>
-            <a:ext cx="1896643" cy="940484"/>
-          </a:xfrm>
-          <a:custGeom>
-            <a:avLst/>
-            <a:gdLst>
-              <a:gd name="connsiteX0" fmla="*/ 0 w 1724221"/>
-              <a:gd name="connsiteY0" fmla="*/ 0 h 1034532"/>
-              <a:gd name="connsiteX1" fmla="*/ 1724221 w 1724221"/>
-              <a:gd name="connsiteY1" fmla="*/ 0 h 1034532"/>
-              <a:gd name="connsiteX2" fmla="*/ 1724221 w 1724221"/>
-              <a:gd name="connsiteY2" fmla="*/ 1034532 h 1034532"/>
-              <a:gd name="connsiteX3" fmla="*/ 0 w 1724221"/>
-              <a:gd name="connsiteY3" fmla="*/ 1034532 h 1034532"/>
-              <a:gd name="connsiteX4" fmla="*/ 0 w 1724221"/>
-              <a:gd name="connsiteY4" fmla="*/ 0 h 1034532"/>
-            </a:gdLst>
-            <a:ahLst/>
-            <a:cxnLst>
-              <a:cxn ang="0">
-                <a:pos x="connsiteX0" y="connsiteY0"/>
-              </a:cxn>
-              <a:cxn ang="0">
-                <a:pos x="connsiteX1" y="connsiteY1"/>
-              </a:cxn>
-              <a:cxn ang="0">
-                <a:pos x="connsiteX2" y="connsiteY2"/>
-              </a:cxn>
-              <a:cxn ang="0">
-                <a:pos x="connsiteX3" y="connsiteY3"/>
-              </a:cxn>
-              <a:cxn ang="0">
-                <a:pos x="connsiteX4" y="connsiteY4"/>
-              </a:cxn>
-            </a:cxnLst>
-            <a:rect l="l" t="t" r="r" b="b"/>
-            <a:pathLst>
-              <a:path w="1724221" h="1034532">
-                <a:moveTo>
-                  <a:pt x="0" y="0"/>
-                </a:moveTo>
-                <a:lnTo>
-                  <a:pt x="1724221" y="0"/>
-                </a:lnTo>
-                <a:lnTo>
-                  <a:pt x="1724221" y="1034532"/>
-                </a:lnTo>
-                <a:lnTo>
-                  <a:pt x="0" y="1034532"/>
-                </a:lnTo>
-                <a:lnTo>
-                  <a:pt x="0" y="0"/>
-                </a:lnTo>
-                <a:close/>
-              </a:path>
-            </a:pathLst>
-          </a:custGeom>
-          <a:solidFill>
-            <a:schemeClr val="accent1">
-              <a:alpha val="20000"/>
-            </a:schemeClr>
-          </a:solidFill>
-          <a:ln>
-            <a:noFill/>
-          </a:ln>
-        </p:spPr>
-        <p:style>
-          <a:lnRef idx="2">
-            <a:schemeClr val="lt1">
-              <a:hueOff val="0"/>
-              <a:satOff val="0"/>
-              <a:lumOff val="0"/>
-              <a:alphaOff val="0"/>
-            </a:schemeClr>
-          </a:lnRef>
-          <a:fillRef idx="1">
-            <a:schemeClr val="accent4">
-              <a:hueOff val="-2678862"/>
-              <a:satOff val="16139"/>
-              <a:lumOff val="1294"/>
-              <a:alphaOff val="0"/>
-            </a:schemeClr>
-          </a:fillRef>
-          <a:effectRef idx="0">
-            <a:schemeClr val="accent4">
-              <a:hueOff val="-2678862"/>
-              <a:satOff val="16139"/>
-              <a:lumOff val="1294"/>
-              <a:alphaOff val="0"/>
-            </a:schemeClr>
-          </a:effectRef>
-          <a:fontRef idx="minor">
-            <a:schemeClr val="lt1"/>
-          </a:fontRef>
-        </p:style>
-        <p:txBody>
-          <a:bodyPr spcFirstLastPara="0" vert="horz" wrap="square" lIns="76200" tIns="76200" rIns="76200" bIns="76200" numCol="1" spcCol="1270" anchor="ctr" anchorCtr="0">
-            <a:noAutofit/>
-          </a:bodyPr>
-          <a:lstStyle/>
-          <a:p>
-            <a:pPr marL="0" lvl="0" indent="0" algn="ctr" defTabSz="889000">
-              <a:lnSpc>
-                <a:spcPct val="90000"/>
-              </a:lnSpc>
-              <a:spcBef>
-                <a:spcPct val="0"/>
-              </a:spcBef>
-              <a:spcAft>
-                <a:spcPct val="35000"/>
-              </a:spcAft>
-              <a:buNone/>
-            </a:pPr>
-            <a:r>
-              <a:rPr lang="es-MX" sz="2000" b="1" kern="1200" dirty="0"/>
-              <a:t>Comentarios</a:t>
-            </a:r>
-            <a:endParaRPr lang="es-CO" sz="2000" b="1" kern="1200" dirty="0"/>
-          </a:p>
-        </p:txBody>
-      </p:sp>
-      <p:sp>
-        <p:nvSpPr>
-          <p:cNvPr id="16" name="Forma libre: forma 15">
-            <a:extLst>
-              <a:ext uri="{FF2B5EF4-FFF2-40B4-BE49-F238E27FC236}">
-                <a16:creationId xmlns:a16="http://schemas.microsoft.com/office/drawing/2014/main" id="{D6FF85AA-A80F-63E4-56C6-32CAF1DD8AAB}"/>
-              </a:ext>
-            </a:extLst>
-          </p:cNvPr>
-          <p:cNvSpPr/>
-          <p:nvPr/>
-        </p:nvSpPr>
-        <p:spPr>
-          <a:xfrm>
-            <a:off x="0" y="3860196"/>
-            <a:ext cx="1896643" cy="940484"/>
-          </a:xfrm>
-          <a:custGeom>
-            <a:avLst/>
-            <a:gdLst>
-              <a:gd name="connsiteX0" fmla="*/ 0 w 1724221"/>
-              <a:gd name="connsiteY0" fmla="*/ 0 h 1034532"/>
-              <a:gd name="connsiteX1" fmla="*/ 1724221 w 1724221"/>
-              <a:gd name="connsiteY1" fmla="*/ 0 h 1034532"/>
-              <a:gd name="connsiteX2" fmla="*/ 1724221 w 1724221"/>
-              <a:gd name="connsiteY2" fmla="*/ 1034532 h 1034532"/>
-              <a:gd name="connsiteX3" fmla="*/ 0 w 1724221"/>
-              <a:gd name="connsiteY3" fmla="*/ 1034532 h 1034532"/>
-              <a:gd name="connsiteX4" fmla="*/ 0 w 1724221"/>
-              <a:gd name="connsiteY4" fmla="*/ 0 h 1034532"/>
-            </a:gdLst>
-            <a:ahLst/>
-            <a:cxnLst>
-              <a:cxn ang="0">
-                <a:pos x="connsiteX0" y="connsiteY0"/>
-              </a:cxn>
-              <a:cxn ang="0">
-                <a:pos x="connsiteX1" y="connsiteY1"/>
-              </a:cxn>
-              <a:cxn ang="0">
-                <a:pos x="connsiteX2" y="connsiteY2"/>
-              </a:cxn>
-              <a:cxn ang="0">
-                <a:pos x="connsiteX3" y="connsiteY3"/>
-              </a:cxn>
-              <a:cxn ang="0">
-                <a:pos x="connsiteX4" y="connsiteY4"/>
-              </a:cxn>
-            </a:cxnLst>
-            <a:rect l="l" t="t" r="r" b="b"/>
-            <a:pathLst>
-              <a:path w="1724221" h="1034532">
-                <a:moveTo>
-                  <a:pt x="0" y="0"/>
-                </a:moveTo>
-                <a:lnTo>
-                  <a:pt x="1724221" y="0"/>
-                </a:lnTo>
-                <a:lnTo>
-                  <a:pt x="1724221" y="1034532"/>
-                </a:lnTo>
-                <a:lnTo>
-                  <a:pt x="0" y="1034532"/>
-                </a:lnTo>
-                <a:lnTo>
-                  <a:pt x="0" y="0"/>
-                </a:lnTo>
-                <a:close/>
-              </a:path>
-            </a:pathLst>
-          </a:custGeom>
-          <a:solidFill>
-            <a:schemeClr val="accent1">
-              <a:alpha val="20000"/>
-            </a:schemeClr>
-          </a:solidFill>
-          <a:ln>
-            <a:noFill/>
-          </a:ln>
-        </p:spPr>
-        <p:style>
-          <a:lnRef idx="2">
-            <a:schemeClr val="lt1">
-              <a:hueOff val="0"/>
-              <a:satOff val="0"/>
-              <a:lumOff val="0"/>
-              <a:alphaOff val="0"/>
-            </a:schemeClr>
-          </a:lnRef>
-          <a:fillRef idx="1">
-            <a:schemeClr val="accent4">
-              <a:hueOff val="-3571816"/>
-              <a:satOff val="21519"/>
-              <a:lumOff val="1725"/>
-              <a:alphaOff val="0"/>
-            </a:schemeClr>
-          </a:fillRef>
-          <a:effectRef idx="0">
-            <a:schemeClr val="accent4">
-              <a:hueOff val="-3571816"/>
-              <a:satOff val="21519"/>
-              <a:lumOff val="1725"/>
-              <a:alphaOff val="0"/>
-            </a:schemeClr>
-          </a:effectRef>
-          <a:fontRef idx="minor">
-            <a:schemeClr val="lt1"/>
-          </a:fontRef>
-        </p:style>
-        <p:txBody>
-          <a:bodyPr spcFirstLastPara="0" vert="horz" wrap="square" lIns="76200" tIns="76200" rIns="76200" bIns="76200" numCol="1" spcCol="1270" anchor="ctr" anchorCtr="0">
-            <a:noAutofit/>
-          </a:bodyPr>
-          <a:lstStyle/>
-          <a:p>
-            <a:pPr marL="0" lvl="0" indent="0" algn="ctr" defTabSz="889000">
-              <a:lnSpc>
-                <a:spcPct val="90000"/>
-              </a:lnSpc>
-              <a:spcBef>
-                <a:spcPct val="0"/>
-              </a:spcBef>
-              <a:spcAft>
-                <a:spcPct val="35000"/>
-              </a:spcAft>
-              <a:buNone/>
-            </a:pPr>
-            <a:r>
-              <a:rPr lang="es-MX" sz="2000" b="1" kern="1200" dirty="0"/>
-              <a:t>Nombres de variables</a:t>
-            </a:r>
-            <a:endParaRPr lang="es-CO" sz="2000" b="1" kern="1200" dirty="0"/>
-          </a:p>
-        </p:txBody>
-      </p:sp>
-      <p:sp>
-        <p:nvSpPr>
-          <p:cNvPr id="17" name="Forma libre: forma 16">
-            <a:extLst>
-              <a:ext uri="{FF2B5EF4-FFF2-40B4-BE49-F238E27FC236}">
-                <a16:creationId xmlns:a16="http://schemas.microsoft.com/office/drawing/2014/main" id="{95527CA0-6267-B9A5-7CF0-22CD51FB9056}"/>
-              </a:ext>
-            </a:extLst>
-          </p:cNvPr>
-          <p:cNvSpPr/>
-          <p:nvPr/>
-        </p:nvSpPr>
-        <p:spPr>
-          <a:xfrm>
-            <a:off x="-1" y="4800680"/>
-            <a:ext cx="1896643" cy="940484"/>
-          </a:xfrm>
-          <a:custGeom>
-            <a:avLst/>
-            <a:gdLst>
-              <a:gd name="connsiteX0" fmla="*/ 0 w 1724221"/>
-              <a:gd name="connsiteY0" fmla="*/ 0 h 1034532"/>
-              <a:gd name="connsiteX1" fmla="*/ 1724221 w 1724221"/>
-              <a:gd name="connsiteY1" fmla="*/ 0 h 1034532"/>
-              <a:gd name="connsiteX2" fmla="*/ 1724221 w 1724221"/>
-              <a:gd name="connsiteY2" fmla="*/ 1034532 h 1034532"/>
-              <a:gd name="connsiteX3" fmla="*/ 0 w 1724221"/>
-              <a:gd name="connsiteY3" fmla="*/ 1034532 h 1034532"/>
-              <a:gd name="connsiteX4" fmla="*/ 0 w 1724221"/>
-              <a:gd name="connsiteY4" fmla="*/ 0 h 1034532"/>
-            </a:gdLst>
-            <a:ahLst/>
-            <a:cxnLst>
-              <a:cxn ang="0">
-                <a:pos x="connsiteX0" y="connsiteY0"/>
-              </a:cxn>
-              <a:cxn ang="0">
-                <a:pos x="connsiteX1" y="connsiteY1"/>
-              </a:cxn>
-              <a:cxn ang="0">
-                <a:pos x="connsiteX2" y="connsiteY2"/>
-              </a:cxn>
-              <a:cxn ang="0">
-                <a:pos x="connsiteX3" y="connsiteY3"/>
-              </a:cxn>
-              <a:cxn ang="0">
-                <a:pos x="connsiteX4" y="connsiteY4"/>
-              </a:cxn>
-            </a:cxnLst>
-            <a:rect l="l" t="t" r="r" b="b"/>
-            <a:pathLst>
-              <a:path w="1724221" h="1034532">
-                <a:moveTo>
-                  <a:pt x="0" y="0"/>
-                </a:moveTo>
-                <a:lnTo>
-                  <a:pt x="1724221" y="0"/>
-                </a:lnTo>
-                <a:lnTo>
-                  <a:pt x="1724221" y="1034532"/>
-                </a:lnTo>
-                <a:lnTo>
-                  <a:pt x="0" y="1034532"/>
-                </a:lnTo>
-                <a:lnTo>
-                  <a:pt x="0" y="0"/>
-                </a:lnTo>
-                <a:close/>
-              </a:path>
-            </a:pathLst>
-          </a:custGeom>
-          <a:ln>
-            <a:noFill/>
-          </a:ln>
-        </p:spPr>
-        <p:style>
-          <a:lnRef idx="2">
-            <a:schemeClr val="lt1">
-              <a:hueOff val="0"/>
-              <a:satOff val="0"/>
-              <a:lumOff val="0"/>
-              <a:alphaOff val="0"/>
-            </a:schemeClr>
-          </a:lnRef>
-          <a:fillRef idx="1">
-            <a:schemeClr val="accent4">
-              <a:hueOff val="-4464770"/>
-              <a:satOff val="26899"/>
-              <a:lumOff val="2156"/>
-              <a:alphaOff val="0"/>
-            </a:schemeClr>
-          </a:fillRef>
-          <a:effectRef idx="0">
-            <a:schemeClr val="accent4">
-              <a:hueOff val="-4464770"/>
-              <a:satOff val="26899"/>
-              <a:lumOff val="2156"/>
-              <a:alphaOff val="0"/>
-            </a:schemeClr>
-          </a:effectRef>
-          <a:fontRef idx="minor">
-            <a:schemeClr val="lt1"/>
-          </a:fontRef>
-        </p:style>
-        <p:txBody>
-          <a:bodyPr spcFirstLastPara="0" vert="horz" wrap="square" lIns="0" tIns="0" rIns="0" bIns="0" numCol="1" spcCol="1270" anchor="ctr" anchorCtr="0">
-            <a:noAutofit/>
-          </a:bodyPr>
-          <a:lstStyle/>
-          <a:p>
-            <a:pPr marL="0" lvl="0" indent="0" algn="ctr" defTabSz="755650">
-              <a:lnSpc>
-                <a:spcPct val="90000"/>
-              </a:lnSpc>
-              <a:spcBef>
-                <a:spcPct val="0"/>
-              </a:spcBef>
-              <a:spcAft>
-                <a:spcPct val="35000"/>
-              </a:spcAft>
-              <a:buNone/>
-            </a:pPr>
-            <a:r>
-              <a:rPr lang="es-MX" sz="1700" b="1" kern="1200" dirty="0"/>
-              <a:t>Recomendaciones</a:t>
-            </a:r>
-            <a:r>
-              <a:rPr lang="es-MX" sz="2000" b="1" kern="1200" dirty="0"/>
-              <a:t> de programación</a:t>
-            </a:r>
-            <a:endParaRPr lang="es-CO" sz="2000" b="1" kern="1200" dirty="0"/>
-          </a:p>
-        </p:txBody>
-      </p:sp>
-    </p:spTree>
-    <p:extLst>
-      <p:ext uri="{BB962C8B-B14F-4D97-AF65-F5344CB8AC3E}">
-        <p14:creationId xmlns:p14="http://schemas.microsoft.com/office/powerpoint/2010/main" val="356653590"/>
-      </p:ext>
-    </p:extLst>
-  </p:cSld>
-  <p:clrMapOvr>
-    <a:masterClrMapping/>
-  </p:clrMapOvr>
-</p:sld>
-</file>
-
-<file path=ppt/slides/slide21.xml><?xml version="1.0" encoding="utf-8"?>
-<p:sld xmlns:a="http://schemas.openxmlformats.org/drawingml/2006/main" xmlns:r="http://schemas.openxmlformats.org/officeDocument/2006/relationships" xmlns:p="http://schemas.openxmlformats.org/presentationml/2006/main">
-  <p:cSld>
-    <p:spTree>
-      <p:nvGrpSpPr>
-        <p:cNvPr id="1" name=""/>
-        <p:cNvGrpSpPr/>
-        <p:nvPr/>
-      </p:nvGrpSpPr>
-      <p:grpSpPr>
-        <a:xfrm>
-          <a:off x="0" y="0"/>
-          <a:ext cx="0" cy="0"/>
-          <a:chOff x="0" y="0"/>
-          <a:chExt cx="0" cy="0"/>
-        </a:xfrm>
-      </p:grpSpPr>
-      <p:sp>
-        <p:nvSpPr>
-          <p:cNvPr id="8" name="Título 7">
-            <a:extLst>
-              <a:ext uri="{FF2B5EF4-FFF2-40B4-BE49-F238E27FC236}">
-                <a16:creationId xmlns:a16="http://schemas.microsoft.com/office/drawing/2014/main" id="{C6BA3E19-8EA0-F3F8-B8DB-8D3D11BCADB7}"/>
-              </a:ext>
-            </a:extLst>
-          </p:cNvPr>
-          <p:cNvSpPr>
-            <a:spLocks noGrp="1"/>
-          </p:cNvSpPr>
-          <p:nvPr>
-            <p:ph type="title"/>
-          </p:nvPr>
-        </p:nvSpPr>
-        <p:spPr/>
-        <p:txBody>
-          <a:bodyPr/>
-          <a:lstStyle/>
-          <a:p>
-            <a:r>
-              <a:rPr lang="es-MX" dirty="0"/>
-              <a:t>Recomendaciones sobre variables</a:t>
-            </a:r>
-            <a:endParaRPr lang="es-CO" dirty="0"/>
-          </a:p>
-        </p:txBody>
-      </p:sp>
-      <p:sp>
-        <p:nvSpPr>
-          <p:cNvPr id="9" name="Marcador de contenido 8">
-            <a:extLst>
-              <a:ext uri="{FF2B5EF4-FFF2-40B4-BE49-F238E27FC236}">
-                <a16:creationId xmlns:a16="http://schemas.microsoft.com/office/drawing/2014/main" id="{0E89874D-BF35-D080-7E5D-1878BF1BD020}"/>
-              </a:ext>
-            </a:extLst>
-          </p:cNvPr>
-          <p:cNvSpPr>
-            <a:spLocks noGrp="1"/>
-          </p:cNvSpPr>
-          <p:nvPr>
-            <p:ph idx="1"/>
-          </p:nvPr>
-        </p:nvSpPr>
-        <p:spPr/>
-        <p:txBody>
-          <a:bodyPr/>
-          <a:lstStyle/>
-          <a:p>
-            <a:endParaRPr lang="es-CO"/>
-          </a:p>
-        </p:txBody>
-      </p:sp>
-      <p:sp>
-        <p:nvSpPr>
-          <p:cNvPr id="12" name="Forma libre: forma 11">
-            <a:extLst>
-              <a:ext uri="{FF2B5EF4-FFF2-40B4-BE49-F238E27FC236}">
-                <a16:creationId xmlns:a16="http://schemas.microsoft.com/office/drawing/2014/main" id="{9EE892CE-1E8F-03BD-7559-EB627E3E1434}"/>
-              </a:ext>
-            </a:extLst>
-          </p:cNvPr>
-          <p:cNvSpPr/>
-          <p:nvPr/>
-        </p:nvSpPr>
-        <p:spPr>
-          <a:xfrm>
-            <a:off x="0" y="98260"/>
-            <a:ext cx="1896643" cy="940484"/>
-          </a:xfrm>
-          <a:custGeom>
-            <a:avLst/>
-            <a:gdLst>
-              <a:gd name="connsiteX0" fmla="*/ 0 w 1724221"/>
-              <a:gd name="connsiteY0" fmla="*/ 0 h 1034532"/>
-              <a:gd name="connsiteX1" fmla="*/ 1724221 w 1724221"/>
-              <a:gd name="connsiteY1" fmla="*/ 0 h 1034532"/>
-              <a:gd name="connsiteX2" fmla="*/ 1724221 w 1724221"/>
-              <a:gd name="connsiteY2" fmla="*/ 1034532 h 1034532"/>
-              <a:gd name="connsiteX3" fmla="*/ 0 w 1724221"/>
-              <a:gd name="connsiteY3" fmla="*/ 1034532 h 1034532"/>
-              <a:gd name="connsiteX4" fmla="*/ 0 w 1724221"/>
-              <a:gd name="connsiteY4" fmla="*/ 0 h 1034532"/>
-            </a:gdLst>
-            <a:ahLst/>
-            <a:cxnLst>
-              <a:cxn ang="0">
-                <a:pos x="connsiteX0" y="connsiteY0"/>
-              </a:cxn>
-              <a:cxn ang="0">
-                <a:pos x="connsiteX1" y="connsiteY1"/>
-              </a:cxn>
-              <a:cxn ang="0">
-                <a:pos x="connsiteX2" y="connsiteY2"/>
-              </a:cxn>
-              <a:cxn ang="0">
-                <a:pos x="connsiteX3" y="connsiteY3"/>
-              </a:cxn>
-              <a:cxn ang="0">
-                <a:pos x="connsiteX4" y="connsiteY4"/>
-              </a:cxn>
-            </a:cxnLst>
-            <a:rect l="l" t="t" r="r" b="b"/>
-            <a:pathLst>
-              <a:path w="1724221" h="1034532">
-                <a:moveTo>
-                  <a:pt x="0" y="0"/>
-                </a:moveTo>
-                <a:lnTo>
-                  <a:pt x="1724221" y="0"/>
-                </a:lnTo>
-                <a:lnTo>
-                  <a:pt x="1724221" y="1034532"/>
-                </a:lnTo>
-                <a:lnTo>
-                  <a:pt x="0" y="1034532"/>
-                </a:lnTo>
-                <a:lnTo>
-                  <a:pt x="0" y="0"/>
-                </a:lnTo>
-                <a:close/>
-              </a:path>
-            </a:pathLst>
-          </a:custGeom>
-          <a:solidFill>
-            <a:schemeClr val="accent1">
-              <a:alpha val="20000"/>
-            </a:schemeClr>
-          </a:solidFill>
-          <a:ln>
-            <a:noFill/>
-          </a:ln>
-        </p:spPr>
-        <p:style>
-          <a:lnRef idx="2">
-            <a:schemeClr val="lt1">
-              <a:hueOff val="0"/>
-              <a:satOff val="0"/>
-              <a:lumOff val="0"/>
-              <a:alphaOff val="0"/>
-            </a:schemeClr>
-          </a:lnRef>
-          <a:fillRef idx="1">
-            <a:schemeClr val="accent4">
-              <a:hueOff val="0"/>
-              <a:satOff val="0"/>
-              <a:lumOff val="0"/>
-              <a:alphaOff val="0"/>
-            </a:schemeClr>
-          </a:fillRef>
-          <a:effectRef idx="0">
-            <a:schemeClr val="accent4">
-              <a:hueOff val="0"/>
-              <a:satOff val="0"/>
-              <a:lumOff val="0"/>
-              <a:alphaOff val="0"/>
-            </a:schemeClr>
-          </a:effectRef>
-          <a:fontRef idx="minor">
-            <a:schemeClr val="lt1"/>
-          </a:fontRef>
-        </p:style>
-        <p:txBody>
-          <a:bodyPr spcFirstLastPara="0" vert="horz" wrap="square" lIns="76200" tIns="76200" rIns="76200" bIns="76200" numCol="1" spcCol="1270" anchor="ctr" anchorCtr="0">
-            <a:noAutofit/>
-          </a:bodyPr>
-          <a:lstStyle/>
-          <a:p>
-            <a:pPr marL="0" lvl="0" indent="0" algn="ctr" defTabSz="889000">
-              <a:lnSpc>
-                <a:spcPct val="90000"/>
-              </a:lnSpc>
-              <a:spcBef>
-                <a:spcPct val="0"/>
-              </a:spcBef>
-              <a:spcAft>
-                <a:spcPct val="35000"/>
-              </a:spcAft>
-              <a:buNone/>
-            </a:pPr>
-            <a:r>
-              <a:rPr lang="es-MX" sz="2000" b="1" kern="1200" dirty="0"/>
-              <a:t>Diseño de código</a:t>
-            </a:r>
-            <a:endParaRPr lang="es-CO" sz="2000" b="1" kern="1200" dirty="0"/>
-          </a:p>
-        </p:txBody>
-      </p:sp>
-      <p:sp>
-        <p:nvSpPr>
-          <p:cNvPr id="13" name="Forma libre: forma 12">
-            <a:extLst>
-              <a:ext uri="{FF2B5EF4-FFF2-40B4-BE49-F238E27FC236}">
-                <a16:creationId xmlns:a16="http://schemas.microsoft.com/office/drawing/2014/main" id="{4398B382-3CA1-6CF5-ABC3-25D90C0CA9E6}"/>
-              </a:ext>
-            </a:extLst>
-          </p:cNvPr>
-          <p:cNvSpPr/>
-          <p:nvPr/>
-        </p:nvSpPr>
-        <p:spPr>
-          <a:xfrm>
-            <a:off x="0" y="1038438"/>
-            <a:ext cx="1896643" cy="940484"/>
-          </a:xfrm>
-          <a:custGeom>
-            <a:avLst/>
-            <a:gdLst>
-              <a:gd name="connsiteX0" fmla="*/ 0 w 1724221"/>
-              <a:gd name="connsiteY0" fmla="*/ 0 h 1034532"/>
-              <a:gd name="connsiteX1" fmla="*/ 1724221 w 1724221"/>
-              <a:gd name="connsiteY1" fmla="*/ 0 h 1034532"/>
-              <a:gd name="connsiteX2" fmla="*/ 1724221 w 1724221"/>
-              <a:gd name="connsiteY2" fmla="*/ 1034532 h 1034532"/>
-              <a:gd name="connsiteX3" fmla="*/ 0 w 1724221"/>
-              <a:gd name="connsiteY3" fmla="*/ 1034532 h 1034532"/>
-              <a:gd name="connsiteX4" fmla="*/ 0 w 1724221"/>
-              <a:gd name="connsiteY4" fmla="*/ 0 h 1034532"/>
-            </a:gdLst>
-            <a:ahLst/>
-            <a:cxnLst>
-              <a:cxn ang="0">
-                <a:pos x="connsiteX0" y="connsiteY0"/>
-              </a:cxn>
-              <a:cxn ang="0">
-                <a:pos x="connsiteX1" y="connsiteY1"/>
-              </a:cxn>
-              <a:cxn ang="0">
-                <a:pos x="connsiteX2" y="connsiteY2"/>
-              </a:cxn>
-              <a:cxn ang="0">
-                <a:pos x="connsiteX3" y="connsiteY3"/>
-              </a:cxn>
-              <a:cxn ang="0">
-                <a:pos x="connsiteX4" y="connsiteY4"/>
-              </a:cxn>
-            </a:cxnLst>
-            <a:rect l="l" t="t" r="r" b="b"/>
-            <a:pathLst>
-              <a:path w="1724221" h="1034532">
-                <a:moveTo>
-                  <a:pt x="0" y="0"/>
-                </a:moveTo>
-                <a:lnTo>
-                  <a:pt x="1724221" y="0"/>
-                </a:lnTo>
-                <a:lnTo>
-                  <a:pt x="1724221" y="1034532"/>
-                </a:lnTo>
-                <a:lnTo>
-                  <a:pt x="0" y="1034532"/>
-                </a:lnTo>
-                <a:lnTo>
-                  <a:pt x="0" y="0"/>
-                </a:lnTo>
-                <a:close/>
-              </a:path>
-            </a:pathLst>
-          </a:custGeom>
-          <a:solidFill>
-            <a:schemeClr val="accent1">
-              <a:alpha val="20000"/>
-            </a:schemeClr>
-          </a:solidFill>
-          <a:ln>
-            <a:noFill/>
-          </a:ln>
-        </p:spPr>
-        <p:style>
-          <a:lnRef idx="2">
-            <a:schemeClr val="lt1">
-              <a:hueOff val="0"/>
-              <a:satOff val="0"/>
-              <a:lumOff val="0"/>
-              <a:alphaOff val="0"/>
-            </a:schemeClr>
-          </a:lnRef>
-          <a:fillRef idx="1">
-            <a:schemeClr val="accent4">
-              <a:hueOff val="-892954"/>
-              <a:satOff val="5380"/>
-              <a:lumOff val="431"/>
-              <a:alphaOff val="0"/>
-            </a:schemeClr>
-          </a:fillRef>
-          <a:effectRef idx="0">
-            <a:schemeClr val="accent4">
-              <a:hueOff val="-892954"/>
-              <a:satOff val="5380"/>
-              <a:lumOff val="431"/>
-              <a:alphaOff val="0"/>
-            </a:schemeClr>
-          </a:effectRef>
-          <a:fontRef idx="minor">
-            <a:schemeClr val="lt1"/>
-          </a:fontRef>
-        </p:style>
-        <p:txBody>
-          <a:bodyPr spcFirstLastPara="0" vert="horz" wrap="square" lIns="76200" tIns="76200" rIns="76200" bIns="76200" numCol="1" spcCol="1270" anchor="ctr" anchorCtr="0">
-            <a:noAutofit/>
-          </a:bodyPr>
-          <a:lstStyle/>
-          <a:p>
-            <a:pPr marL="0" lvl="0" indent="0" algn="ctr" defTabSz="889000">
-              <a:lnSpc>
-                <a:spcPct val="90000"/>
-              </a:lnSpc>
-              <a:spcBef>
-                <a:spcPct val="0"/>
-              </a:spcBef>
-              <a:spcAft>
-                <a:spcPct val="35000"/>
-              </a:spcAft>
-              <a:buNone/>
-            </a:pPr>
-            <a:r>
-              <a:rPr lang="es-MX" sz="2000" b="1" kern="1200" dirty="0"/>
-              <a:t>Espacios en blanco</a:t>
-            </a:r>
-            <a:endParaRPr lang="es-CO" sz="2000" b="1" kern="1200" dirty="0"/>
-          </a:p>
-        </p:txBody>
-      </p:sp>
-      <p:sp>
-        <p:nvSpPr>
-          <p:cNvPr id="14" name="Forma libre: forma 13">
-            <a:extLst>
-              <a:ext uri="{FF2B5EF4-FFF2-40B4-BE49-F238E27FC236}">
-                <a16:creationId xmlns:a16="http://schemas.microsoft.com/office/drawing/2014/main" id="{4E855BA1-2E86-D90B-DAE5-412CD2AB8209}"/>
-              </a:ext>
-            </a:extLst>
-          </p:cNvPr>
-          <p:cNvSpPr/>
-          <p:nvPr/>
-        </p:nvSpPr>
-        <p:spPr>
-          <a:xfrm>
-            <a:off x="0" y="1979228"/>
-            <a:ext cx="1896643" cy="940484"/>
-          </a:xfrm>
-          <a:custGeom>
-            <a:avLst/>
-            <a:gdLst>
-              <a:gd name="connsiteX0" fmla="*/ 0 w 1724221"/>
-              <a:gd name="connsiteY0" fmla="*/ 0 h 1034532"/>
-              <a:gd name="connsiteX1" fmla="*/ 1724221 w 1724221"/>
-              <a:gd name="connsiteY1" fmla="*/ 0 h 1034532"/>
-              <a:gd name="connsiteX2" fmla="*/ 1724221 w 1724221"/>
-              <a:gd name="connsiteY2" fmla="*/ 1034532 h 1034532"/>
-              <a:gd name="connsiteX3" fmla="*/ 0 w 1724221"/>
-              <a:gd name="connsiteY3" fmla="*/ 1034532 h 1034532"/>
-              <a:gd name="connsiteX4" fmla="*/ 0 w 1724221"/>
-              <a:gd name="connsiteY4" fmla="*/ 0 h 1034532"/>
-            </a:gdLst>
-            <a:ahLst/>
-            <a:cxnLst>
-              <a:cxn ang="0">
-                <a:pos x="connsiteX0" y="connsiteY0"/>
-              </a:cxn>
-              <a:cxn ang="0">
-                <a:pos x="connsiteX1" y="connsiteY1"/>
-              </a:cxn>
-              <a:cxn ang="0">
-                <a:pos x="connsiteX2" y="connsiteY2"/>
-              </a:cxn>
-              <a:cxn ang="0">
-                <a:pos x="connsiteX3" y="connsiteY3"/>
-              </a:cxn>
-              <a:cxn ang="0">
-                <a:pos x="connsiteX4" y="connsiteY4"/>
-              </a:cxn>
-            </a:cxnLst>
-            <a:rect l="l" t="t" r="r" b="b"/>
-            <a:pathLst>
-              <a:path w="1724221" h="1034532">
-                <a:moveTo>
-                  <a:pt x="0" y="0"/>
-                </a:moveTo>
-                <a:lnTo>
-                  <a:pt x="1724221" y="0"/>
-                </a:lnTo>
-                <a:lnTo>
-                  <a:pt x="1724221" y="1034532"/>
-                </a:lnTo>
-                <a:lnTo>
-                  <a:pt x="0" y="1034532"/>
-                </a:lnTo>
-                <a:lnTo>
-                  <a:pt x="0" y="0"/>
-                </a:lnTo>
-                <a:close/>
-              </a:path>
-            </a:pathLst>
-          </a:custGeom>
-          <a:solidFill>
-            <a:schemeClr val="accent1">
-              <a:alpha val="20000"/>
-            </a:schemeClr>
-          </a:solidFill>
-          <a:ln>
-            <a:noFill/>
-          </a:ln>
-        </p:spPr>
-        <p:style>
-          <a:lnRef idx="2">
-            <a:schemeClr val="lt1">
-              <a:hueOff val="0"/>
-              <a:satOff val="0"/>
-              <a:lumOff val="0"/>
-              <a:alphaOff val="0"/>
-            </a:schemeClr>
-          </a:lnRef>
-          <a:fillRef idx="1">
-            <a:schemeClr val="accent4">
-              <a:hueOff val="-1785908"/>
-              <a:satOff val="10760"/>
-              <a:lumOff val="862"/>
-              <a:alphaOff val="0"/>
-            </a:schemeClr>
-          </a:fillRef>
-          <a:effectRef idx="0">
-            <a:schemeClr val="accent4">
-              <a:hueOff val="-1785908"/>
-              <a:satOff val="10760"/>
-              <a:lumOff val="862"/>
-              <a:alphaOff val="0"/>
-            </a:schemeClr>
-          </a:effectRef>
-          <a:fontRef idx="minor">
-            <a:schemeClr val="lt1"/>
-          </a:fontRef>
-        </p:style>
-        <p:txBody>
-          <a:bodyPr spcFirstLastPara="0" vert="horz" wrap="square" lIns="76200" tIns="76200" rIns="76200" bIns="76200" numCol="1" spcCol="1270" anchor="ctr" anchorCtr="0">
-            <a:noAutofit/>
-          </a:bodyPr>
-          <a:lstStyle/>
-          <a:p>
-            <a:pPr marL="0" lvl="0" indent="0" algn="ctr" defTabSz="889000">
-              <a:lnSpc>
-                <a:spcPct val="90000"/>
-              </a:lnSpc>
-              <a:spcBef>
-                <a:spcPct val="0"/>
-              </a:spcBef>
-              <a:spcAft>
-                <a:spcPct val="35000"/>
-              </a:spcAft>
-              <a:buNone/>
-            </a:pPr>
-            <a:r>
-              <a:rPr lang="es-MX" sz="2000" b="1" kern="1200" dirty="0"/>
-              <a:t>Uso de comas</a:t>
-            </a:r>
-            <a:endParaRPr lang="es-CO" sz="2000" b="1" kern="1200" dirty="0"/>
-          </a:p>
-        </p:txBody>
-      </p:sp>
-      <p:sp>
-        <p:nvSpPr>
-          <p:cNvPr id="15" name="Forma libre: forma 14">
-            <a:extLst>
-              <a:ext uri="{FF2B5EF4-FFF2-40B4-BE49-F238E27FC236}">
-                <a16:creationId xmlns:a16="http://schemas.microsoft.com/office/drawing/2014/main" id="{F79C7960-AAA9-6B61-7465-A9652CE96BB7}"/>
-              </a:ext>
-            </a:extLst>
-          </p:cNvPr>
-          <p:cNvSpPr/>
-          <p:nvPr/>
-        </p:nvSpPr>
-        <p:spPr>
-          <a:xfrm>
-            <a:off x="0" y="2919712"/>
-            <a:ext cx="1896643" cy="940484"/>
-          </a:xfrm>
-          <a:custGeom>
-            <a:avLst/>
-            <a:gdLst>
-              <a:gd name="connsiteX0" fmla="*/ 0 w 1724221"/>
-              <a:gd name="connsiteY0" fmla="*/ 0 h 1034532"/>
-              <a:gd name="connsiteX1" fmla="*/ 1724221 w 1724221"/>
-              <a:gd name="connsiteY1" fmla="*/ 0 h 1034532"/>
-              <a:gd name="connsiteX2" fmla="*/ 1724221 w 1724221"/>
-              <a:gd name="connsiteY2" fmla="*/ 1034532 h 1034532"/>
-              <a:gd name="connsiteX3" fmla="*/ 0 w 1724221"/>
-              <a:gd name="connsiteY3" fmla="*/ 1034532 h 1034532"/>
-              <a:gd name="connsiteX4" fmla="*/ 0 w 1724221"/>
-              <a:gd name="connsiteY4" fmla="*/ 0 h 1034532"/>
-            </a:gdLst>
-            <a:ahLst/>
-            <a:cxnLst>
-              <a:cxn ang="0">
-                <a:pos x="connsiteX0" y="connsiteY0"/>
-              </a:cxn>
-              <a:cxn ang="0">
-                <a:pos x="connsiteX1" y="connsiteY1"/>
-              </a:cxn>
-              <a:cxn ang="0">
-                <a:pos x="connsiteX2" y="connsiteY2"/>
-              </a:cxn>
-              <a:cxn ang="0">
-                <a:pos x="connsiteX3" y="connsiteY3"/>
-              </a:cxn>
-              <a:cxn ang="0">
-                <a:pos x="connsiteX4" y="connsiteY4"/>
-              </a:cxn>
-            </a:cxnLst>
-            <a:rect l="l" t="t" r="r" b="b"/>
-            <a:pathLst>
-              <a:path w="1724221" h="1034532">
-                <a:moveTo>
-                  <a:pt x="0" y="0"/>
-                </a:moveTo>
-                <a:lnTo>
-                  <a:pt x="1724221" y="0"/>
-                </a:lnTo>
-                <a:lnTo>
-                  <a:pt x="1724221" y="1034532"/>
-                </a:lnTo>
-                <a:lnTo>
-                  <a:pt x="0" y="1034532"/>
-                </a:lnTo>
-                <a:lnTo>
-                  <a:pt x="0" y="0"/>
-                </a:lnTo>
-                <a:close/>
-              </a:path>
-            </a:pathLst>
-          </a:custGeom>
-          <a:solidFill>
-            <a:schemeClr val="accent1">
-              <a:alpha val="20000"/>
-            </a:schemeClr>
-          </a:solidFill>
-          <a:ln>
-            <a:noFill/>
-          </a:ln>
-        </p:spPr>
-        <p:style>
-          <a:lnRef idx="2">
-            <a:schemeClr val="lt1">
-              <a:hueOff val="0"/>
-              <a:satOff val="0"/>
-              <a:lumOff val="0"/>
-              <a:alphaOff val="0"/>
-            </a:schemeClr>
-          </a:lnRef>
-          <a:fillRef idx="1">
-            <a:schemeClr val="accent4">
-              <a:hueOff val="-2678862"/>
-              <a:satOff val="16139"/>
-              <a:lumOff val="1294"/>
-              <a:alphaOff val="0"/>
-            </a:schemeClr>
-          </a:fillRef>
-          <a:effectRef idx="0">
-            <a:schemeClr val="accent4">
-              <a:hueOff val="-2678862"/>
-              <a:satOff val="16139"/>
-              <a:lumOff val="1294"/>
-              <a:alphaOff val="0"/>
-            </a:schemeClr>
-          </a:effectRef>
-          <a:fontRef idx="minor">
-            <a:schemeClr val="lt1"/>
-          </a:fontRef>
-        </p:style>
-        <p:txBody>
-          <a:bodyPr spcFirstLastPara="0" vert="horz" wrap="square" lIns="76200" tIns="76200" rIns="76200" bIns="76200" numCol="1" spcCol="1270" anchor="ctr" anchorCtr="0">
-            <a:noAutofit/>
-          </a:bodyPr>
-          <a:lstStyle/>
-          <a:p>
-            <a:pPr marL="0" lvl="0" indent="0" algn="ctr" defTabSz="889000">
-              <a:lnSpc>
-                <a:spcPct val="90000"/>
-              </a:lnSpc>
-              <a:spcBef>
-                <a:spcPct val="0"/>
-              </a:spcBef>
-              <a:spcAft>
-                <a:spcPct val="35000"/>
-              </a:spcAft>
-              <a:buNone/>
-            </a:pPr>
-            <a:r>
-              <a:rPr lang="es-MX" sz="2000" b="1" kern="1200" dirty="0"/>
-              <a:t>Comentarios</a:t>
-            </a:r>
-            <a:endParaRPr lang="es-CO" sz="2000" b="1" kern="1200" dirty="0"/>
-          </a:p>
-        </p:txBody>
-      </p:sp>
-      <p:sp>
-        <p:nvSpPr>
-          <p:cNvPr id="16" name="Forma libre: forma 15">
-            <a:extLst>
-              <a:ext uri="{FF2B5EF4-FFF2-40B4-BE49-F238E27FC236}">
-                <a16:creationId xmlns:a16="http://schemas.microsoft.com/office/drawing/2014/main" id="{D6FF85AA-A80F-63E4-56C6-32CAF1DD8AAB}"/>
-              </a:ext>
-            </a:extLst>
-          </p:cNvPr>
-          <p:cNvSpPr/>
-          <p:nvPr/>
-        </p:nvSpPr>
-        <p:spPr>
-          <a:xfrm>
-            <a:off x="0" y="3860196"/>
-            <a:ext cx="1896643" cy="940484"/>
-          </a:xfrm>
-          <a:custGeom>
-            <a:avLst/>
-            <a:gdLst>
-              <a:gd name="connsiteX0" fmla="*/ 0 w 1724221"/>
-              <a:gd name="connsiteY0" fmla="*/ 0 h 1034532"/>
-              <a:gd name="connsiteX1" fmla="*/ 1724221 w 1724221"/>
-              <a:gd name="connsiteY1" fmla="*/ 0 h 1034532"/>
-              <a:gd name="connsiteX2" fmla="*/ 1724221 w 1724221"/>
-              <a:gd name="connsiteY2" fmla="*/ 1034532 h 1034532"/>
-              <a:gd name="connsiteX3" fmla="*/ 0 w 1724221"/>
-              <a:gd name="connsiteY3" fmla="*/ 1034532 h 1034532"/>
-              <a:gd name="connsiteX4" fmla="*/ 0 w 1724221"/>
-              <a:gd name="connsiteY4" fmla="*/ 0 h 1034532"/>
-            </a:gdLst>
-            <a:ahLst/>
-            <a:cxnLst>
-              <a:cxn ang="0">
-                <a:pos x="connsiteX0" y="connsiteY0"/>
-              </a:cxn>
-              <a:cxn ang="0">
-                <a:pos x="connsiteX1" y="connsiteY1"/>
-              </a:cxn>
-              <a:cxn ang="0">
-                <a:pos x="connsiteX2" y="connsiteY2"/>
-              </a:cxn>
-              <a:cxn ang="0">
-                <a:pos x="connsiteX3" y="connsiteY3"/>
-              </a:cxn>
-              <a:cxn ang="0">
-                <a:pos x="connsiteX4" y="connsiteY4"/>
-              </a:cxn>
-            </a:cxnLst>
-            <a:rect l="l" t="t" r="r" b="b"/>
-            <a:pathLst>
-              <a:path w="1724221" h="1034532">
-                <a:moveTo>
-                  <a:pt x="0" y="0"/>
-                </a:moveTo>
-                <a:lnTo>
-                  <a:pt x="1724221" y="0"/>
-                </a:lnTo>
-                <a:lnTo>
-                  <a:pt x="1724221" y="1034532"/>
-                </a:lnTo>
-                <a:lnTo>
-                  <a:pt x="0" y="1034532"/>
-                </a:lnTo>
-                <a:lnTo>
-                  <a:pt x="0" y="0"/>
-                </a:lnTo>
-                <a:close/>
-              </a:path>
-            </a:pathLst>
-          </a:custGeom>
-          <a:solidFill>
-            <a:schemeClr val="accent1">
-              <a:alpha val="20000"/>
-            </a:schemeClr>
-          </a:solidFill>
-          <a:ln>
-            <a:noFill/>
-          </a:ln>
-        </p:spPr>
-        <p:style>
-          <a:lnRef idx="2">
-            <a:schemeClr val="lt1">
-              <a:hueOff val="0"/>
-              <a:satOff val="0"/>
-              <a:lumOff val="0"/>
-              <a:alphaOff val="0"/>
-            </a:schemeClr>
-          </a:lnRef>
-          <a:fillRef idx="1">
-            <a:schemeClr val="accent4">
-              <a:hueOff val="-3571816"/>
-              <a:satOff val="21519"/>
-              <a:lumOff val="1725"/>
-              <a:alphaOff val="0"/>
-            </a:schemeClr>
-          </a:fillRef>
-          <a:effectRef idx="0">
-            <a:schemeClr val="accent4">
-              <a:hueOff val="-3571816"/>
-              <a:satOff val="21519"/>
-              <a:lumOff val="1725"/>
-              <a:alphaOff val="0"/>
-            </a:schemeClr>
-          </a:effectRef>
-          <a:fontRef idx="minor">
-            <a:schemeClr val="lt1"/>
-          </a:fontRef>
-        </p:style>
-        <p:txBody>
-          <a:bodyPr spcFirstLastPara="0" vert="horz" wrap="square" lIns="76200" tIns="76200" rIns="76200" bIns="76200" numCol="1" spcCol="1270" anchor="ctr" anchorCtr="0">
-            <a:noAutofit/>
-          </a:bodyPr>
-          <a:lstStyle/>
-          <a:p>
-            <a:pPr marL="0" lvl="0" indent="0" algn="ctr" defTabSz="889000">
-              <a:lnSpc>
-                <a:spcPct val="90000"/>
-              </a:lnSpc>
-              <a:spcBef>
-                <a:spcPct val="0"/>
-              </a:spcBef>
-              <a:spcAft>
-                <a:spcPct val="35000"/>
-              </a:spcAft>
-              <a:buNone/>
-            </a:pPr>
-            <a:r>
-              <a:rPr lang="es-MX" sz="2000" b="1" kern="1200" dirty="0"/>
-              <a:t>Nombres de variables</a:t>
-            </a:r>
-            <a:endParaRPr lang="es-CO" sz="2000" b="1" kern="1200" dirty="0"/>
-          </a:p>
-        </p:txBody>
-      </p:sp>
-      <p:sp>
-        <p:nvSpPr>
-          <p:cNvPr id="17" name="Forma libre: forma 16">
-            <a:extLst>
-              <a:ext uri="{FF2B5EF4-FFF2-40B4-BE49-F238E27FC236}">
-                <a16:creationId xmlns:a16="http://schemas.microsoft.com/office/drawing/2014/main" id="{95527CA0-6267-B9A5-7CF0-22CD51FB9056}"/>
-              </a:ext>
-            </a:extLst>
-          </p:cNvPr>
-          <p:cNvSpPr/>
-          <p:nvPr/>
-        </p:nvSpPr>
-        <p:spPr>
-          <a:xfrm>
-            <a:off x="-1" y="4800680"/>
-            <a:ext cx="1896643" cy="940484"/>
-          </a:xfrm>
-          <a:custGeom>
-            <a:avLst/>
-            <a:gdLst>
-              <a:gd name="connsiteX0" fmla="*/ 0 w 1724221"/>
-              <a:gd name="connsiteY0" fmla="*/ 0 h 1034532"/>
-              <a:gd name="connsiteX1" fmla="*/ 1724221 w 1724221"/>
-              <a:gd name="connsiteY1" fmla="*/ 0 h 1034532"/>
-              <a:gd name="connsiteX2" fmla="*/ 1724221 w 1724221"/>
-              <a:gd name="connsiteY2" fmla="*/ 1034532 h 1034532"/>
-              <a:gd name="connsiteX3" fmla="*/ 0 w 1724221"/>
-              <a:gd name="connsiteY3" fmla="*/ 1034532 h 1034532"/>
-              <a:gd name="connsiteX4" fmla="*/ 0 w 1724221"/>
-              <a:gd name="connsiteY4" fmla="*/ 0 h 1034532"/>
-            </a:gdLst>
-            <a:ahLst/>
-            <a:cxnLst>
-              <a:cxn ang="0">
-                <a:pos x="connsiteX0" y="connsiteY0"/>
-              </a:cxn>
-              <a:cxn ang="0">
-                <a:pos x="connsiteX1" y="connsiteY1"/>
-              </a:cxn>
-              <a:cxn ang="0">
-                <a:pos x="connsiteX2" y="connsiteY2"/>
-              </a:cxn>
-              <a:cxn ang="0">
-                <a:pos x="connsiteX3" y="connsiteY3"/>
-              </a:cxn>
-              <a:cxn ang="0">
-                <a:pos x="connsiteX4" y="connsiteY4"/>
-              </a:cxn>
-            </a:cxnLst>
-            <a:rect l="l" t="t" r="r" b="b"/>
-            <a:pathLst>
-              <a:path w="1724221" h="1034532">
-                <a:moveTo>
-                  <a:pt x="0" y="0"/>
-                </a:moveTo>
-                <a:lnTo>
-                  <a:pt x="1724221" y="0"/>
-                </a:lnTo>
-                <a:lnTo>
-                  <a:pt x="1724221" y="1034532"/>
-                </a:lnTo>
-                <a:lnTo>
-                  <a:pt x="0" y="1034532"/>
-                </a:lnTo>
-                <a:lnTo>
-                  <a:pt x="0" y="0"/>
-                </a:lnTo>
-                <a:close/>
-              </a:path>
-            </a:pathLst>
-          </a:custGeom>
-          <a:ln>
-            <a:noFill/>
-          </a:ln>
-        </p:spPr>
-        <p:style>
-          <a:lnRef idx="2">
-            <a:schemeClr val="lt1">
-              <a:hueOff val="0"/>
-              <a:satOff val="0"/>
-              <a:lumOff val="0"/>
-              <a:alphaOff val="0"/>
-            </a:schemeClr>
-          </a:lnRef>
-          <a:fillRef idx="1">
-            <a:schemeClr val="accent4">
-              <a:hueOff val="-4464770"/>
-              <a:satOff val="26899"/>
-              <a:lumOff val="2156"/>
-              <a:alphaOff val="0"/>
-            </a:schemeClr>
-          </a:fillRef>
-          <a:effectRef idx="0">
-            <a:schemeClr val="accent4">
-              <a:hueOff val="-4464770"/>
-              <a:satOff val="26899"/>
-              <a:lumOff val="2156"/>
-              <a:alphaOff val="0"/>
-            </a:schemeClr>
-          </a:effectRef>
-          <a:fontRef idx="minor">
-            <a:schemeClr val="lt1"/>
-          </a:fontRef>
-        </p:style>
-        <p:txBody>
-          <a:bodyPr spcFirstLastPara="0" vert="horz" wrap="square" lIns="0" tIns="0" rIns="0" bIns="0" numCol="1" spcCol="1270" anchor="ctr" anchorCtr="0">
-            <a:noAutofit/>
-          </a:bodyPr>
-          <a:lstStyle/>
-          <a:p>
-            <a:pPr marL="0" lvl="0" indent="0" algn="ctr" defTabSz="755650">
-              <a:lnSpc>
-                <a:spcPct val="90000"/>
-              </a:lnSpc>
-              <a:spcBef>
-                <a:spcPct val="0"/>
-              </a:spcBef>
-              <a:spcAft>
-                <a:spcPct val="35000"/>
-              </a:spcAft>
-              <a:buNone/>
-            </a:pPr>
-            <a:r>
-              <a:rPr lang="es-MX" sz="1700" b="1" kern="1200" dirty="0"/>
-              <a:t>Recomendaciones</a:t>
-            </a:r>
-            <a:r>
-              <a:rPr lang="es-MX" sz="2000" b="1" kern="1200" dirty="0"/>
-              <a:t> de programación</a:t>
-            </a:r>
-            <a:endParaRPr lang="es-CO" sz="2000" b="1" kern="1200" dirty="0"/>
-          </a:p>
-        </p:txBody>
-      </p:sp>
-    </p:spTree>
-    <p:extLst>
-      <p:ext uri="{BB962C8B-B14F-4D97-AF65-F5344CB8AC3E}">
-        <p14:creationId xmlns:p14="http://schemas.microsoft.com/office/powerpoint/2010/main" val="61617883"/>
-      </p:ext>
-    </p:extLst>
-  </p:cSld>
-  <p:clrMapOvr>
-    <a:masterClrMapping/>
-  </p:clrMapOvr>
-</p:sld>
-</file>
-
-<file path=ppt/slides/slide22.xml><?xml version="1.0" encoding="utf-8"?>
-<p:sld xmlns:a="http://schemas.openxmlformats.org/drawingml/2006/main" xmlns:r="http://schemas.openxmlformats.org/officeDocument/2006/relationships" xmlns:p="http://schemas.openxmlformats.org/presentationml/2006/main">
-  <p:cSld>
-    <p:spTree>
-      <p:nvGrpSpPr>
-        <p:cNvPr id="1" name=""/>
-        <p:cNvGrpSpPr/>
-        <p:nvPr/>
-      </p:nvGrpSpPr>
-      <p:grpSpPr>
-        <a:xfrm>
-          <a:off x="0" y="0"/>
-          <a:ext cx="0" cy="0"/>
-          <a:chOff x="0" y="0"/>
-          <a:chExt cx="0" cy="0"/>
-        </a:xfrm>
-      </p:grpSpPr>
-      <p:sp>
-        <p:nvSpPr>
-          <p:cNvPr id="2" name="Título 1">
-            <a:extLst>
-              <a:ext uri="{FF2B5EF4-FFF2-40B4-BE49-F238E27FC236}">
-                <a16:creationId xmlns:a16="http://schemas.microsoft.com/office/drawing/2014/main" id="{25285F03-93D0-9569-1901-AF49B03A5B4A}"/>
-              </a:ext>
-            </a:extLst>
-          </p:cNvPr>
-          <p:cNvSpPr>
-            <a:spLocks noGrp="1"/>
-          </p:cNvSpPr>
-          <p:nvPr>
-            <p:ph type="title"/>
-          </p:nvPr>
-        </p:nvSpPr>
-        <p:spPr/>
-        <p:txBody>
-          <a:bodyPr/>
-          <a:lstStyle/>
-          <a:p>
-            <a:endParaRPr lang="es-CO"/>
-          </a:p>
-        </p:txBody>
-      </p:sp>
-      <p:sp>
-        <p:nvSpPr>
-          <p:cNvPr id="3" name="Marcador de contenido 2">
-            <a:extLst>
-              <a:ext uri="{FF2B5EF4-FFF2-40B4-BE49-F238E27FC236}">
-                <a16:creationId xmlns:a16="http://schemas.microsoft.com/office/drawing/2014/main" id="{2A7B93E9-C27F-3511-BDC3-084AC5E0BE8E}"/>
-              </a:ext>
-            </a:extLst>
-          </p:cNvPr>
-          <p:cNvSpPr>
-            <a:spLocks noGrp="1"/>
-          </p:cNvSpPr>
-          <p:nvPr>
-            <p:ph idx="1"/>
-          </p:nvPr>
-        </p:nvSpPr>
-        <p:spPr/>
-        <p:txBody>
-          <a:bodyPr/>
-          <a:lstStyle/>
-          <a:p>
-            <a:r>
-              <a:rPr lang="es-CO" dirty="0">
-                <a:hlinkClick r:id="rId2"/>
-              </a:rPr>
-              <a:t>https://pythones.net/funcion-super-en-python-bien-explicada-ejemplos-oop/</a:t>
-            </a:r>
-            <a:endParaRPr lang="es-CO" dirty="0"/>
-          </a:p>
-          <a:p>
-            <a:endParaRPr lang="es-CO" dirty="0"/>
-          </a:p>
-          <a:p>
-            <a:r>
-              <a:rPr lang="es-CO" dirty="0">
-                <a:hlinkClick r:id="rId3"/>
-              </a:rPr>
-              <a:t>https://github.com/karencastrog/ProgAvanzada.git</a:t>
-            </a:r>
-            <a:endParaRPr lang="es-CO" dirty="0"/>
-          </a:p>
-          <a:p>
-            <a:r>
-              <a:rPr lang="es-CO" dirty="0">
-                <a:hlinkClick r:id="rId4"/>
-              </a:rPr>
-              <a:t>https://j2logo.com/string-replace-python/</a:t>
-            </a:r>
-            <a:endParaRPr lang="es-CO" dirty="0"/>
-          </a:p>
-          <a:p>
-            <a:endParaRPr lang="es-CO" dirty="0"/>
-          </a:p>
-          <a:p>
-            <a:endParaRPr lang="es-CO" dirty="0"/>
-          </a:p>
-        </p:txBody>
-      </p:sp>
-    </p:spTree>
-    <p:extLst>
-      <p:ext uri="{BB962C8B-B14F-4D97-AF65-F5344CB8AC3E}">
-        <p14:creationId xmlns:p14="http://schemas.microsoft.com/office/powerpoint/2010/main" val="4105327864"/>
-      </p:ext>
-    </p:extLst>
-  </p:cSld>
-  <p:clrMapOvr>
-    <a:masterClrMapping/>
-  </p:clrMapOvr>
-</p:sld>
-</file>
-
-<file path=ppt/slides/slide23.xml><?xml version="1.0" encoding="utf-8"?>
-<p:sld xmlns:a="http://schemas.openxmlformats.org/drawingml/2006/main" xmlns:r="http://schemas.openxmlformats.org/officeDocument/2006/relationships" xmlns:p="http://schemas.openxmlformats.org/presentationml/2006/main">
-  <p:cSld>
-    <p:spTree>
-      <p:nvGrpSpPr>
-        <p:cNvPr id="1" name=""/>
-        <p:cNvGrpSpPr/>
-        <p:nvPr/>
-      </p:nvGrpSpPr>
-      <p:grpSpPr>
-        <a:xfrm>
-          <a:off x="0" y="0"/>
-          <a:ext cx="0" cy="0"/>
-          <a:chOff x="0" y="0"/>
-          <a:chExt cx="0" cy="0"/>
-        </a:xfrm>
-      </p:grpSpPr>
-    </p:spTree>
-    <p:extLst>
-      <p:ext uri="{BB962C8B-B14F-4D97-AF65-F5344CB8AC3E}">
-        <p14:creationId xmlns:p14="http://schemas.microsoft.com/office/powerpoint/2010/main" val="2810833794"/>
-      </p:ext>
-    </p:extLst>
-  </p:cSld>
-  <p:clrMapOvr>
-    <a:masterClrMapping/>
-  </p:clrMapOvr>
 </p:sld>
 </file>
 

</xml_diff>